<commit_message>
Add node architecture to day 1, start day 2
</commit_message>
<xml_diff>
--- a/slides/Node Slides Day 1.pptx
+++ b/slides/Node Slides Day 1.pptx
@@ -47,6 +47,16 @@
     <p:sldId id="329" r:id="rId41"/>
     <p:sldId id="330" r:id="rId42"/>
     <p:sldId id="332" r:id="rId43"/>
+    <p:sldId id="335" r:id="rId44"/>
+    <p:sldId id="336" r:id="rId45"/>
+    <p:sldId id="337" r:id="rId46"/>
+    <p:sldId id="333" r:id="rId47"/>
+    <p:sldId id="338" r:id="rId48"/>
+    <p:sldId id="339" r:id="rId49"/>
+    <p:sldId id="340" r:id="rId50"/>
+    <p:sldId id="341" r:id="rId51"/>
+    <p:sldId id="342" r:id="rId52"/>
+    <p:sldId id="334" r:id="rId53"/>
   </p:sldIdLst>
   <p:sldSz cx="9144000" cy="6858000" type="screen4x3"/>
   <p:notesSz cx="6858000" cy="9144000"/>
@@ -329,7 +339,7 @@
           <a:p>
             <a:fld id="{6BFECD78-3C8E-49F2-8FAB-59489D168ABB}" type="datetimeFigureOut">
               <a:rPr lang="en-US" smtClean="0"/>
-              <a:t>11/6/16</a:t>
+              <a:t>11/8/16</a:t>
             </a:fld>
             <a:endParaRPr lang="en-US"/>
           </a:p>
@@ -499,7 +509,7 @@
           <a:p>
             <a:fld id="{6BFECD78-3C8E-49F2-8FAB-59489D168ABB}" type="datetimeFigureOut">
               <a:rPr lang="en-US" smtClean="0"/>
-              <a:t>11/6/16</a:t>
+              <a:t>11/8/16</a:t>
             </a:fld>
             <a:endParaRPr lang="en-US"/>
           </a:p>
@@ -679,7 +689,7 @@
           <a:p>
             <a:fld id="{6BFECD78-3C8E-49F2-8FAB-59489D168ABB}" type="datetimeFigureOut">
               <a:rPr lang="en-US" smtClean="0"/>
-              <a:t>11/6/16</a:t>
+              <a:t>11/8/16</a:t>
             </a:fld>
             <a:endParaRPr lang="en-US"/>
           </a:p>
@@ -849,7 +859,7 @@
           <a:p>
             <a:fld id="{6BFECD78-3C8E-49F2-8FAB-59489D168ABB}" type="datetimeFigureOut">
               <a:rPr lang="en-US" smtClean="0"/>
-              <a:t>11/6/16</a:t>
+              <a:t>11/8/16</a:t>
             </a:fld>
             <a:endParaRPr lang="en-US"/>
           </a:p>
@@ -1095,7 +1105,7 @@
           <a:p>
             <a:fld id="{6BFECD78-3C8E-49F2-8FAB-59489D168ABB}" type="datetimeFigureOut">
               <a:rPr lang="en-US" smtClean="0"/>
-              <a:t>11/6/16</a:t>
+              <a:t>11/8/16</a:t>
             </a:fld>
             <a:endParaRPr lang="en-US"/>
           </a:p>
@@ -1383,7 +1393,7 @@
           <a:p>
             <a:fld id="{6BFECD78-3C8E-49F2-8FAB-59489D168ABB}" type="datetimeFigureOut">
               <a:rPr lang="en-US" smtClean="0"/>
-              <a:t>11/6/16</a:t>
+              <a:t>11/8/16</a:t>
             </a:fld>
             <a:endParaRPr lang="en-US"/>
           </a:p>
@@ -1805,7 +1815,7 @@
           <a:p>
             <a:fld id="{6BFECD78-3C8E-49F2-8FAB-59489D168ABB}" type="datetimeFigureOut">
               <a:rPr lang="en-US" smtClean="0"/>
-              <a:t>11/6/16</a:t>
+              <a:t>11/8/16</a:t>
             </a:fld>
             <a:endParaRPr lang="en-US"/>
           </a:p>
@@ -1923,7 +1933,7 @@
           <a:p>
             <a:fld id="{6BFECD78-3C8E-49F2-8FAB-59489D168ABB}" type="datetimeFigureOut">
               <a:rPr lang="en-US" smtClean="0"/>
-              <a:t>11/6/16</a:t>
+              <a:t>11/8/16</a:t>
             </a:fld>
             <a:endParaRPr lang="en-US"/>
           </a:p>
@@ -2018,7 +2028,7 @@
           <a:p>
             <a:fld id="{6BFECD78-3C8E-49F2-8FAB-59489D168ABB}" type="datetimeFigureOut">
               <a:rPr lang="en-US" smtClean="0"/>
-              <a:t>11/6/16</a:t>
+              <a:t>11/8/16</a:t>
             </a:fld>
             <a:endParaRPr lang="en-US"/>
           </a:p>
@@ -2295,7 +2305,7 @@
           <a:p>
             <a:fld id="{6BFECD78-3C8E-49F2-8FAB-59489D168ABB}" type="datetimeFigureOut">
               <a:rPr lang="en-US" smtClean="0"/>
-              <a:t>11/6/16</a:t>
+              <a:t>11/8/16</a:t>
             </a:fld>
             <a:endParaRPr lang="en-US"/>
           </a:p>
@@ -2552,7 +2562,7 @@
           <a:p>
             <a:fld id="{6BFECD78-3C8E-49F2-8FAB-59489D168ABB}" type="datetimeFigureOut">
               <a:rPr lang="en-US" smtClean="0"/>
-              <a:t>11/6/16</a:t>
+              <a:t>11/8/16</a:t>
             </a:fld>
             <a:endParaRPr lang="en-US"/>
           </a:p>
@@ -2765,7 +2775,7 @@
           <a:p>
             <a:fld id="{6BFECD78-3C8E-49F2-8FAB-59489D168ABB}" type="datetimeFigureOut">
               <a:rPr lang="en-US" smtClean="0"/>
-              <a:t>11/6/16</a:t>
+              <a:t>11/8/16</a:t>
             </a:fld>
             <a:endParaRPr lang="en-US"/>
           </a:p>
@@ -3161,11 +3171,7 @@
             </a:r>
             <a:r>
               <a:rPr lang="en-US" dirty="0" smtClean="0"/>
-              <a:t> </a:t>
-            </a:r>
-            <a:r>
-              <a:rPr lang="en-US" dirty="0" smtClean="0"/>
-              <a:t>training</a:t>
+              <a:t> training</a:t>
             </a:r>
             <a:r>
               <a:rPr lang="en-US" dirty="0"/>
@@ -4158,6 +4164,17 @@
             </a:pPr>
             <a:r>
               <a:rPr lang="en-US" dirty="0" smtClean="0"/>
+              <a:t>Intentionally lowercase</a:t>
+            </a:r>
+            <a:endParaRPr lang="en-US" dirty="0" smtClean="0"/>
+          </a:p>
+          <a:p>
+            <a:pPr marL="342900" indent="-342900" algn="l">
+              <a:buFont typeface="Arial"/>
+              <a:buChar char="•"/>
+            </a:pPr>
+            <a:r>
+              <a:rPr lang="en-US" dirty="0" smtClean="0"/>
               <a:t>Execute via CLI</a:t>
             </a:r>
           </a:p>
@@ -4896,6 +4913,26 @@
               <a:rPr lang="en-US" dirty="0" smtClean="0"/>
               <a:t>Advanced JavaScript</a:t>
             </a:r>
+          </a:p>
+          <a:p>
+            <a:pPr marL="457200" indent="-457200" algn="l">
+              <a:buFont typeface="Arial"/>
+              <a:buChar char="•"/>
+            </a:pPr>
+            <a:r>
+              <a:rPr lang="en-US" dirty="0" smtClean="0"/>
+              <a:t>Lunch</a:t>
+            </a:r>
+          </a:p>
+          <a:p>
+            <a:pPr marL="457200" indent="-457200" algn="l">
+              <a:buFont typeface="Arial"/>
+              <a:buChar char="•"/>
+            </a:pPr>
+            <a:r>
+              <a:rPr lang="en-US" dirty="0" err="1" smtClean="0"/>
+              <a:t>npm</a:t>
+            </a:r>
             <a:endParaRPr lang="en-US" dirty="0" smtClean="0"/>
           </a:p>
           <a:p>
@@ -4904,18 +4941,16 @@
               <a:buChar char="•"/>
             </a:pPr>
             <a:r>
-              <a:rPr lang="en-US" dirty="0" smtClean="0"/>
-              <a:t>Lunch</a:t>
-            </a:r>
-          </a:p>
-          <a:p>
-            <a:pPr marL="457200" indent="-457200" algn="l">
-              <a:buFont typeface="Arial"/>
-              <a:buChar char="•"/>
-            </a:pPr>
-            <a:r>
-              <a:rPr lang="en-US" dirty="0" err="1" smtClean="0"/>
-              <a:t>npm</a:t>
+              <a:rPr lang="en-US" dirty="0" err="1" smtClean="0"/>
+              <a:t>Node.js</a:t>
+            </a:r>
+            <a:r>
+              <a:rPr lang="en-US" dirty="0"/>
+              <a:t> </a:t>
+            </a:r>
+            <a:r>
+              <a:rPr lang="en-US" dirty="0" smtClean="0"/>
+              <a:t>architecture (event loop)</a:t>
             </a:r>
             <a:endParaRPr lang="en-US" dirty="0"/>
           </a:p>
@@ -8564,7 +8599,7 @@
         </p:spPr>
         <p:txBody>
           <a:bodyPr>
-            <a:normAutofit/>
+            <a:normAutofit lnSpcReduction="10000"/>
           </a:bodyPr>
           <a:lstStyle/>
           <a:p>
@@ -8584,9 +8619,33 @@
               <a:t>Intro to </a:t>
             </a:r>
             <a:r>
-              <a:rPr lang="en-US" dirty="0" err="1" smtClean="0"/>
+              <a:rPr lang="en-US" dirty="0" err="1"/>
               <a:t>Node.js</a:t>
             </a:r>
+            <a:r>
+              <a:rPr lang="en-US" dirty="0"/>
+              <a:t> + REPL</a:t>
+            </a:r>
+          </a:p>
+          <a:p>
+            <a:pPr marL="457200" indent="-457200" algn="l">
+              <a:buFont typeface="Arial"/>
+              <a:buChar char="•"/>
+            </a:pPr>
+            <a:r>
+              <a:rPr lang="en-US" dirty="0"/>
+              <a:t>Advanced JavaScript</a:t>
+            </a:r>
+          </a:p>
+          <a:p>
+            <a:pPr marL="457200" indent="-457200" algn="l">
+              <a:buFont typeface="Arial"/>
+              <a:buChar char="•"/>
+            </a:pPr>
+            <a:r>
+              <a:rPr lang="en-US" dirty="0" err="1" smtClean="0"/>
+              <a:t>npm</a:t>
+            </a:r>
             <a:endParaRPr lang="en-US" dirty="0"/>
           </a:p>
           <a:p>
@@ -8595,8 +8654,28 @@
               <a:buChar char="•"/>
             </a:pPr>
             <a:r>
+              <a:rPr lang="en-US" dirty="0" err="1"/>
+              <a:t>Node.js</a:t>
+            </a:r>
+            <a:r>
               <a:rPr lang="en-US" dirty="0"/>
-              <a:t>Advanced JS</a:t>
+              <a:t> </a:t>
+            </a:r>
+            <a:r>
+              <a:rPr lang="en-US" dirty="0" smtClean="0"/>
+              <a:t>architecture (event loop)</a:t>
+            </a:r>
+            <a:endParaRPr lang="en-US" dirty="0"/>
+          </a:p>
+          <a:p>
+            <a:pPr algn="l"/>
+            <a:r>
+              <a:rPr lang="en-US" dirty="0" smtClean="0"/>
+              <a:t>Day </a:t>
+            </a:r>
+            <a:r>
+              <a:rPr lang="en-US" dirty="0" smtClean="0"/>
+              <a:t>2</a:t>
             </a:r>
           </a:p>
           <a:p>
@@ -8606,19 +8685,11 @@
             </a:pPr>
             <a:r>
               <a:rPr lang="en-US" dirty="0" err="1" smtClean="0"/>
-              <a:t>npm</a:t>
-            </a:r>
-            <a:endParaRPr lang="en-US" dirty="0"/>
-          </a:p>
-          <a:p>
-            <a:pPr algn="l"/>
-            <a:r>
-              <a:rPr lang="en-US" dirty="0" smtClean="0"/>
-              <a:t>Day </a:t>
-            </a:r>
-            <a:r>
-              <a:rPr lang="en-US" dirty="0" smtClean="0"/>
-              <a:t>2</a:t>
+              <a:t>Node.js</a:t>
+            </a:r>
+            <a:r>
+              <a:rPr lang="en-US" dirty="0" smtClean="0"/>
+              <a:t> Building Blocks</a:t>
             </a:r>
           </a:p>
           <a:p>
@@ -8627,22 +8698,16 @@
               <a:buChar char="•"/>
             </a:pPr>
             <a:r>
-              <a:rPr lang="en-US" dirty="0" err="1" smtClean="0"/>
-              <a:t>Node.js</a:t>
-            </a:r>
-            <a:r>
-              <a:rPr lang="en-US" dirty="0" smtClean="0"/>
-              <a:t> Building Blocks</a:t>
-            </a:r>
-          </a:p>
-          <a:p>
-            <a:pPr marL="457200" indent="-457200" algn="l">
-              <a:buFont typeface="Arial"/>
-              <a:buChar char="•"/>
-            </a:pPr>
-            <a:r>
-              <a:rPr lang="en-US" dirty="0" smtClean="0"/>
-              <a:t>Data</a:t>
+              <a:rPr lang="en-US" dirty="0" smtClean="0"/>
+              <a:t>Working with data (</a:t>
+            </a:r>
+            <a:r>
+              <a:rPr lang="en-US" dirty="0" err="1" smtClean="0"/>
+              <a:t>files,dB</a:t>
+            </a:r>
+            <a:r>
+              <a:rPr lang="en-US" dirty="0" smtClean="0"/>
+              <a:t>)</a:t>
             </a:r>
             <a:endParaRPr lang="en-US" dirty="0"/>
           </a:p>
@@ -9254,6 +9319,2215 @@
 </p:sld>
 </file>
 
+<file path=ppt/slides/slide43.xml><?xml version="1.0" encoding="utf-8"?>
+<p:sld xmlns:a="http://schemas.openxmlformats.org/drawingml/2006/main" xmlns:r="http://schemas.openxmlformats.org/officeDocument/2006/relationships" xmlns:p="http://schemas.openxmlformats.org/presentationml/2006/main">
+  <p:cSld>
+    <p:spTree>
+      <p:nvGrpSpPr>
+        <p:cNvPr id="1" name=""/>
+        <p:cNvGrpSpPr/>
+        <p:nvPr/>
+      </p:nvGrpSpPr>
+      <p:grpSpPr>
+        <a:xfrm>
+          <a:off x="0" y="0"/>
+          <a:ext cx="0" cy="0"/>
+          <a:chOff x="0" y="0"/>
+          <a:chExt cx="0" cy="0"/>
+        </a:xfrm>
+      </p:grpSpPr>
+      <p:sp>
+        <p:nvSpPr>
+          <p:cNvPr id="2" name="Title 1"/>
+          <p:cNvSpPr>
+            <a:spLocks noGrp="1"/>
+          </p:cNvSpPr>
+          <p:nvPr>
+            <p:ph type="ctrTitle"/>
+          </p:nvPr>
+        </p:nvSpPr>
+        <p:spPr>
+          <a:xfrm>
+            <a:off x="685800" y="160685"/>
+            <a:ext cx="7772400" cy="1470025"/>
+          </a:xfrm>
+        </p:spPr>
+        <p:txBody>
+          <a:bodyPr/>
+          <a:lstStyle/>
+          <a:p>
+            <a:r>
+              <a:rPr lang="en-US" dirty="0" err="1" smtClean="0"/>
+              <a:t>Node.js</a:t>
+            </a:r>
+            <a:r>
+              <a:rPr lang="en-US" dirty="0" smtClean="0"/>
+              <a:t> architecture</a:t>
+            </a:r>
+            <a:endParaRPr lang="en-US" dirty="0"/>
+          </a:p>
+        </p:txBody>
+      </p:sp>
+      <p:sp>
+        <p:nvSpPr>
+          <p:cNvPr id="3" name="Subtitle 2"/>
+          <p:cNvSpPr>
+            <a:spLocks noGrp="1"/>
+          </p:cNvSpPr>
+          <p:nvPr>
+            <p:ph type="subTitle" idx="1"/>
+          </p:nvPr>
+        </p:nvSpPr>
+        <p:spPr>
+          <a:xfrm>
+            <a:off x="1371600" y="1630710"/>
+            <a:ext cx="6400800" cy="4609893"/>
+          </a:xfrm>
+        </p:spPr>
+        <p:txBody>
+          <a:bodyPr>
+            <a:normAutofit/>
+          </a:bodyPr>
+          <a:lstStyle/>
+          <a:p>
+            <a:pPr marL="0" lvl="1" algn="l"/>
+            <a:r>
+              <a:rPr lang="en-US" dirty="0" smtClean="0"/>
+              <a:t>Why </a:t>
+            </a:r>
+            <a:r>
+              <a:rPr lang="en-US" dirty="0" err="1" smtClean="0"/>
+              <a:t>Node.js</a:t>
+            </a:r>
+            <a:r>
+              <a:rPr lang="en-US" dirty="0" smtClean="0"/>
+              <a:t>?</a:t>
+            </a:r>
+          </a:p>
+          <a:p>
+            <a:pPr lvl="1" indent="-457200" algn="l">
+              <a:buFont typeface="Arial"/>
+              <a:buChar char="•"/>
+            </a:pPr>
+            <a:r>
+              <a:rPr lang="en-US" dirty="0" smtClean="0"/>
+              <a:t>The dirty secret of web servers</a:t>
+            </a:r>
+          </a:p>
+          <a:p>
+            <a:pPr lvl="1" indent="-457200" algn="l">
+              <a:buFont typeface="Arial"/>
+              <a:buChar char="•"/>
+            </a:pPr>
+            <a:r>
+              <a:rPr lang="en-US" dirty="0" smtClean="0"/>
+              <a:t>Most of the time the CPU is idle</a:t>
+            </a:r>
+          </a:p>
+          <a:p>
+            <a:pPr lvl="1" indent="-457200" algn="l">
+              <a:buFont typeface="Arial"/>
+              <a:buChar char="•"/>
+            </a:pPr>
+            <a:r>
+              <a:rPr lang="en-US" dirty="0" smtClean="0"/>
+              <a:t>Waiting on data from somewhere else</a:t>
+            </a:r>
+          </a:p>
+          <a:p>
+            <a:pPr lvl="1" indent="-457200" algn="l">
+              <a:buFont typeface="Arial"/>
+              <a:buChar char="•"/>
+            </a:pPr>
+            <a:r>
+              <a:rPr lang="en-US" dirty="0" smtClean="0"/>
+              <a:t>Concurrency &gt; Computation</a:t>
+            </a:r>
+          </a:p>
+        </p:txBody>
+      </p:sp>
+    </p:spTree>
+    <p:extLst>
+      <p:ext uri="{BB962C8B-B14F-4D97-AF65-F5344CB8AC3E}">
+        <p14:creationId xmlns:p14="http://schemas.microsoft.com/office/powerpoint/2010/main" val="781477868"/>
+      </p:ext>
+    </p:extLst>
+  </p:cSld>
+  <p:clrMapOvr>
+    <a:masterClrMapping/>
+  </p:clrMapOvr>
+</p:sld>
+</file>
+
+<file path=ppt/slides/slide44.xml><?xml version="1.0" encoding="utf-8"?>
+<p:sld xmlns:a="http://schemas.openxmlformats.org/drawingml/2006/main" xmlns:r="http://schemas.openxmlformats.org/officeDocument/2006/relationships" xmlns:p="http://schemas.openxmlformats.org/presentationml/2006/main">
+  <p:cSld>
+    <p:spTree>
+      <p:nvGrpSpPr>
+        <p:cNvPr id="1" name=""/>
+        <p:cNvGrpSpPr/>
+        <p:nvPr/>
+      </p:nvGrpSpPr>
+      <p:grpSpPr>
+        <a:xfrm>
+          <a:off x="0" y="0"/>
+          <a:ext cx="0" cy="0"/>
+          <a:chOff x="0" y="0"/>
+          <a:chExt cx="0" cy="0"/>
+        </a:xfrm>
+      </p:grpSpPr>
+      <p:sp>
+        <p:nvSpPr>
+          <p:cNvPr id="2" name="Title 1"/>
+          <p:cNvSpPr>
+            <a:spLocks noGrp="1"/>
+          </p:cNvSpPr>
+          <p:nvPr>
+            <p:ph type="ctrTitle"/>
+          </p:nvPr>
+        </p:nvSpPr>
+        <p:spPr>
+          <a:xfrm>
+            <a:off x="685800" y="160685"/>
+            <a:ext cx="7772400" cy="1470025"/>
+          </a:xfrm>
+        </p:spPr>
+        <p:txBody>
+          <a:bodyPr/>
+          <a:lstStyle/>
+          <a:p>
+            <a:r>
+              <a:rPr lang="en-US" dirty="0" err="1" smtClean="0"/>
+              <a:t>Node.js</a:t>
+            </a:r>
+            <a:r>
+              <a:rPr lang="en-US" dirty="0" smtClean="0"/>
+              <a:t> architecture</a:t>
+            </a:r>
+            <a:endParaRPr lang="en-US" dirty="0"/>
+          </a:p>
+        </p:txBody>
+      </p:sp>
+      <p:sp>
+        <p:nvSpPr>
+          <p:cNvPr id="3" name="Subtitle 2"/>
+          <p:cNvSpPr>
+            <a:spLocks noGrp="1"/>
+          </p:cNvSpPr>
+          <p:nvPr>
+            <p:ph type="subTitle" idx="1"/>
+          </p:nvPr>
+        </p:nvSpPr>
+        <p:spPr>
+          <a:xfrm>
+            <a:off x="1371600" y="1630710"/>
+            <a:ext cx="6400800" cy="4609893"/>
+          </a:xfrm>
+        </p:spPr>
+        <p:txBody>
+          <a:bodyPr>
+            <a:normAutofit fontScale="92500" lnSpcReduction="10000"/>
+          </a:bodyPr>
+          <a:lstStyle/>
+          <a:p>
+            <a:pPr marL="0" lvl="1" algn="l"/>
+            <a:r>
+              <a:rPr lang="en-US" dirty="0" smtClean="0"/>
+              <a:t>Set up new connection – 50ms</a:t>
+            </a:r>
+          </a:p>
+          <a:p>
+            <a:pPr marL="0" lvl="1" algn="l"/>
+            <a:r>
+              <a:rPr lang="en-US" dirty="0" smtClean="0"/>
+              <a:t>Send query to dB – 20ms</a:t>
+            </a:r>
+          </a:p>
+          <a:p>
+            <a:pPr marL="0" lvl="1" algn="l"/>
+            <a:r>
+              <a:rPr lang="en-US" dirty="0" smtClean="0"/>
+              <a:t>(wait) – 125-400ms</a:t>
+            </a:r>
+          </a:p>
+          <a:p>
+            <a:pPr marL="0" lvl="1" algn="l"/>
+            <a:r>
+              <a:rPr lang="en-US" dirty="0" smtClean="0"/>
+              <a:t>Process</a:t>
+            </a:r>
+            <a:r>
+              <a:rPr lang="en-US" dirty="0" smtClean="0"/>
+              <a:t> query results – 50ms</a:t>
+            </a:r>
+          </a:p>
+          <a:p>
+            <a:pPr marL="0" lvl="1" algn="l"/>
+            <a:r>
+              <a:rPr lang="en-US" dirty="0"/>
+              <a:t>Business logic – 20</a:t>
+            </a:r>
+            <a:r>
+              <a:rPr lang="en-US" dirty="0" smtClean="0"/>
+              <a:t>-75ms</a:t>
+            </a:r>
+          </a:p>
+          <a:p>
+            <a:pPr marL="0" lvl="1" algn="l"/>
+            <a:r>
+              <a:rPr lang="en-US" dirty="0" smtClean="0"/>
+              <a:t>Call a web service – 35ms</a:t>
+            </a:r>
+          </a:p>
+          <a:p>
+            <a:pPr marL="0" lvl="1" algn="l"/>
+            <a:r>
+              <a:rPr lang="en-US" dirty="0" smtClean="0"/>
+              <a:t>(wait) – 200-750ms</a:t>
+            </a:r>
+          </a:p>
+          <a:p>
+            <a:pPr marL="0" lvl="1" algn="l"/>
+            <a:r>
+              <a:rPr lang="en-US" dirty="0" smtClean="0"/>
+              <a:t>Process results – 20ms</a:t>
+            </a:r>
+          </a:p>
+          <a:p>
+            <a:pPr marL="0" lvl="1" algn="l"/>
+            <a:r>
+              <a:rPr lang="en-US" dirty="0" smtClean="0"/>
+              <a:t>Send to network – 20ms</a:t>
+            </a:r>
+          </a:p>
+          <a:p>
+            <a:pPr marL="0" lvl="1" algn="l"/>
+            <a:r>
+              <a:rPr lang="en-US" dirty="0" smtClean="0"/>
+              <a:t>(end)</a:t>
+            </a:r>
+            <a:endParaRPr lang="en-US" dirty="0"/>
+          </a:p>
+          <a:p>
+            <a:pPr marL="0" lvl="1" algn="l"/>
+            <a:endParaRPr lang="en-US" dirty="0" smtClean="0"/>
+          </a:p>
+        </p:txBody>
+      </p:sp>
+    </p:spTree>
+    <p:extLst>
+      <p:ext uri="{BB962C8B-B14F-4D97-AF65-F5344CB8AC3E}">
+        <p14:creationId xmlns:p14="http://schemas.microsoft.com/office/powerpoint/2010/main" val="1417984726"/>
+      </p:ext>
+    </p:extLst>
+  </p:cSld>
+  <p:clrMapOvr>
+    <a:masterClrMapping/>
+  </p:clrMapOvr>
+</p:sld>
+</file>
+
+<file path=ppt/slides/slide45.xml><?xml version="1.0" encoding="utf-8"?>
+<p:sld xmlns:a="http://schemas.openxmlformats.org/drawingml/2006/main" xmlns:r="http://schemas.openxmlformats.org/officeDocument/2006/relationships" xmlns:p="http://schemas.openxmlformats.org/presentationml/2006/main">
+  <p:cSld>
+    <p:spTree>
+      <p:nvGrpSpPr>
+        <p:cNvPr id="1" name=""/>
+        <p:cNvGrpSpPr/>
+        <p:nvPr/>
+      </p:nvGrpSpPr>
+      <p:grpSpPr>
+        <a:xfrm>
+          <a:off x="0" y="0"/>
+          <a:ext cx="0" cy="0"/>
+          <a:chOff x="0" y="0"/>
+          <a:chExt cx="0" cy="0"/>
+        </a:xfrm>
+      </p:grpSpPr>
+      <p:sp>
+        <p:nvSpPr>
+          <p:cNvPr id="2" name="Title 1"/>
+          <p:cNvSpPr>
+            <a:spLocks noGrp="1"/>
+          </p:cNvSpPr>
+          <p:nvPr>
+            <p:ph type="ctrTitle"/>
+          </p:nvPr>
+        </p:nvSpPr>
+        <p:spPr>
+          <a:xfrm>
+            <a:off x="685800" y="160685"/>
+            <a:ext cx="7772400" cy="1470025"/>
+          </a:xfrm>
+        </p:spPr>
+        <p:txBody>
+          <a:bodyPr/>
+          <a:lstStyle/>
+          <a:p>
+            <a:r>
+              <a:rPr lang="en-US" dirty="0" err="1" smtClean="0"/>
+              <a:t>Node.js</a:t>
+            </a:r>
+            <a:r>
+              <a:rPr lang="en-US" dirty="0" smtClean="0"/>
+              <a:t> architecture</a:t>
+            </a:r>
+            <a:endParaRPr lang="en-US" dirty="0"/>
+          </a:p>
+        </p:txBody>
+      </p:sp>
+      <p:sp>
+        <p:nvSpPr>
+          <p:cNvPr id="3" name="Subtitle 2"/>
+          <p:cNvSpPr>
+            <a:spLocks noGrp="1"/>
+          </p:cNvSpPr>
+          <p:nvPr>
+            <p:ph type="subTitle" idx="1"/>
+          </p:nvPr>
+        </p:nvSpPr>
+        <p:spPr>
+          <a:xfrm>
+            <a:off x="763704" y="1898701"/>
+            <a:ext cx="2474686" cy="5115123"/>
+          </a:xfrm>
+        </p:spPr>
+        <p:txBody>
+          <a:bodyPr>
+            <a:normAutofit fontScale="62500" lnSpcReduction="20000"/>
+          </a:bodyPr>
+          <a:lstStyle/>
+          <a:p>
+            <a:pPr marL="0" lvl="1" algn="l"/>
+            <a:r>
+              <a:rPr lang="en-US" dirty="0" smtClean="0"/>
+              <a:t>Set up new connection</a:t>
+            </a:r>
+          </a:p>
+          <a:p>
+            <a:pPr marL="0" lvl="1" algn="l"/>
+            <a:r>
+              <a:rPr lang="en-US" dirty="0" smtClean="0"/>
+              <a:t>Send query to dB</a:t>
+            </a:r>
+          </a:p>
+          <a:p>
+            <a:pPr marL="0" lvl="1" algn="l"/>
+            <a:r>
+              <a:rPr lang="en-US" dirty="0" smtClean="0"/>
+              <a:t>             (</a:t>
+            </a:r>
+            <a:r>
+              <a:rPr lang="en-US" dirty="0"/>
+              <a:t>wait)</a:t>
+            </a:r>
+          </a:p>
+          <a:p>
+            <a:pPr marL="0" lvl="1" algn="l"/>
+            <a:r>
+              <a:rPr lang="en-US" dirty="0"/>
+              <a:t>	|</a:t>
+            </a:r>
+          </a:p>
+          <a:p>
+            <a:pPr marL="0" lvl="1" algn="l"/>
+            <a:r>
+              <a:rPr lang="en-US" dirty="0"/>
+              <a:t>	|</a:t>
+            </a:r>
+          </a:p>
+          <a:p>
+            <a:pPr marL="0" lvl="1" algn="l"/>
+            <a:r>
+              <a:rPr lang="en-US" dirty="0" smtClean="0"/>
+              <a:t>	|</a:t>
+            </a:r>
+          </a:p>
+          <a:p>
+            <a:pPr marL="0" lvl="1" algn="l"/>
+            <a:r>
+              <a:rPr lang="en-US" dirty="0"/>
+              <a:t>	</a:t>
+            </a:r>
+            <a:r>
+              <a:rPr lang="en-US" dirty="0" smtClean="0"/>
+              <a:t>|</a:t>
+            </a:r>
+          </a:p>
+          <a:p>
+            <a:pPr marL="0" lvl="1" algn="l"/>
+            <a:r>
+              <a:rPr lang="en-US" dirty="0"/>
+              <a:t>	</a:t>
+            </a:r>
+            <a:r>
+              <a:rPr lang="en-US" dirty="0" smtClean="0"/>
+              <a:t>V</a:t>
+            </a:r>
+          </a:p>
+          <a:p>
+            <a:pPr marL="0" lvl="1" algn="l"/>
+            <a:r>
+              <a:rPr lang="en-US" dirty="0" smtClean="0"/>
+              <a:t>Process</a:t>
+            </a:r>
+            <a:r>
+              <a:rPr lang="en-US" dirty="0" smtClean="0"/>
+              <a:t> query results</a:t>
+            </a:r>
+          </a:p>
+          <a:p>
+            <a:pPr marL="0" lvl="1" algn="l"/>
+            <a:r>
+              <a:rPr lang="en-US" dirty="0"/>
+              <a:t>Business </a:t>
+            </a:r>
+            <a:r>
+              <a:rPr lang="en-US" dirty="0" smtClean="0"/>
+              <a:t>logic</a:t>
+            </a:r>
+          </a:p>
+          <a:p>
+            <a:pPr marL="0" lvl="1" algn="l"/>
+            <a:r>
+              <a:rPr lang="en-US" dirty="0" smtClean="0"/>
+              <a:t>Call a web service</a:t>
+            </a:r>
+          </a:p>
+          <a:p>
+            <a:pPr marL="0" lvl="1" algn="l"/>
+            <a:r>
+              <a:rPr lang="en-US" dirty="0" smtClean="0"/>
+              <a:t>             </a:t>
+            </a:r>
+            <a:r>
+              <a:rPr lang="en-US" dirty="0"/>
+              <a:t>(wait)</a:t>
+            </a:r>
+          </a:p>
+          <a:p>
+            <a:pPr marL="0" lvl="1" algn="l"/>
+            <a:r>
+              <a:rPr lang="en-US" dirty="0"/>
+              <a:t>	|</a:t>
+            </a:r>
+          </a:p>
+          <a:p>
+            <a:pPr marL="0" lvl="1" algn="l"/>
+            <a:r>
+              <a:rPr lang="en-US" dirty="0"/>
+              <a:t>	|</a:t>
+            </a:r>
+          </a:p>
+          <a:p>
+            <a:pPr marL="0" lvl="1" algn="l"/>
+            <a:r>
+              <a:rPr lang="en-US" dirty="0"/>
+              <a:t>	</a:t>
+            </a:r>
+            <a:r>
+              <a:rPr lang="en-US" dirty="0" smtClean="0"/>
+              <a:t>V</a:t>
+            </a:r>
+          </a:p>
+          <a:p>
+            <a:pPr marL="0" lvl="1" algn="l"/>
+            <a:r>
+              <a:rPr lang="en-US" dirty="0" smtClean="0"/>
+              <a:t>Process results</a:t>
+            </a:r>
+          </a:p>
+          <a:p>
+            <a:pPr marL="0" lvl="1" algn="l"/>
+            <a:r>
+              <a:rPr lang="en-US" dirty="0" smtClean="0"/>
+              <a:t>Send to network</a:t>
+            </a:r>
+          </a:p>
+          <a:p>
+            <a:pPr marL="0" lvl="1" algn="l"/>
+            <a:r>
+              <a:rPr lang="en-US" dirty="0"/>
+              <a:t> </a:t>
+            </a:r>
+            <a:r>
+              <a:rPr lang="en-US" dirty="0" smtClean="0"/>
+              <a:t>             (end)</a:t>
+            </a:r>
+            <a:endParaRPr lang="en-US" dirty="0"/>
+          </a:p>
+          <a:p>
+            <a:pPr marL="0" lvl="1" algn="l"/>
+            <a:endParaRPr lang="en-US" dirty="0" smtClean="0"/>
+          </a:p>
+        </p:txBody>
+      </p:sp>
+      <p:sp>
+        <p:nvSpPr>
+          <p:cNvPr id="4" name="Subtitle 2"/>
+          <p:cNvSpPr txBox="1">
+            <a:spLocks/>
+          </p:cNvSpPr>
+          <p:nvPr/>
+        </p:nvSpPr>
+        <p:spPr>
+          <a:xfrm>
+            <a:off x="2842526" y="2403931"/>
+            <a:ext cx="2474686" cy="4609893"/>
+          </a:xfrm>
+          <a:prstGeom prst="rect">
+            <a:avLst/>
+          </a:prstGeom>
+        </p:spPr>
+        <p:txBody>
+          <a:bodyPr vert="horz" lIns="91440" tIns="45720" rIns="91440" bIns="45720" rtlCol="0">
+            <a:normAutofit fontScale="62500" lnSpcReduction="20000"/>
+          </a:bodyPr>
+          <a:lstStyle>
+            <a:lvl1pPr marL="0" indent="0" algn="ctr" defTabSz="914400" rtl="0" eaLnBrk="1" latinLnBrk="0" hangingPunct="1">
+              <a:spcBef>
+                <a:spcPct val="20000"/>
+              </a:spcBef>
+              <a:buFont typeface="Arial" pitchFamily="34" charset="0"/>
+              <a:buNone/>
+              <a:defRPr sz="3200" kern="1200">
+                <a:solidFill>
+                  <a:schemeClr val="tx1">
+                    <a:tint val="75000"/>
+                  </a:schemeClr>
+                </a:solidFill>
+                <a:latin typeface="+mn-lt"/>
+                <a:ea typeface="+mn-ea"/>
+                <a:cs typeface="+mn-cs"/>
+              </a:defRPr>
+            </a:lvl1pPr>
+            <a:lvl2pPr marL="457200" indent="0" algn="ctr" defTabSz="914400" rtl="0" eaLnBrk="1" latinLnBrk="0" hangingPunct="1">
+              <a:spcBef>
+                <a:spcPct val="20000"/>
+              </a:spcBef>
+              <a:buFont typeface="Arial" pitchFamily="34" charset="0"/>
+              <a:buNone/>
+              <a:defRPr sz="2800" kern="1200">
+                <a:solidFill>
+                  <a:schemeClr val="tx1">
+                    <a:tint val="75000"/>
+                  </a:schemeClr>
+                </a:solidFill>
+                <a:latin typeface="+mn-lt"/>
+                <a:ea typeface="+mn-ea"/>
+                <a:cs typeface="+mn-cs"/>
+              </a:defRPr>
+            </a:lvl2pPr>
+            <a:lvl3pPr marL="914400" indent="0" algn="ctr" defTabSz="914400" rtl="0" eaLnBrk="1" latinLnBrk="0" hangingPunct="1">
+              <a:spcBef>
+                <a:spcPct val="20000"/>
+              </a:spcBef>
+              <a:buFont typeface="Arial" pitchFamily="34" charset="0"/>
+              <a:buNone/>
+              <a:defRPr sz="2400" kern="1200">
+                <a:solidFill>
+                  <a:schemeClr val="tx1">
+                    <a:tint val="75000"/>
+                  </a:schemeClr>
+                </a:solidFill>
+                <a:latin typeface="+mn-lt"/>
+                <a:ea typeface="+mn-ea"/>
+                <a:cs typeface="+mn-cs"/>
+              </a:defRPr>
+            </a:lvl3pPr>
+            <a:lvl4pPr marL="1371600" indent="0" algn="ctr" defTabSz="914400" rtl="0" eaLnBrk="1" latinLnBrk="0" hangingPunct="1">
+              <a:spcBef>
+                <a:spcPct val="20000"/>
+              </a:spcBef>
+              <a:buFont typeface="Arial" pitchFamily="34" charset="0"/>
+              <a:buNone/>
+              <a:defRPr sz="2000" kern="1200">
+                <a:solidFill>
+                  <a:schemeClr val="tx1">
+                    <a:tint val="75000"/>
+                  </a:schemeClr>
+                </a:solidFill>
+                <a:latin typeface="+mn-lt"/>
+                <a:ea typeface="+mn-ea"/>
+                <a:cs typeface="+mn-cs"/>
+              </a:defRPr>
+            </a:lvl4pPr>
+            <a:lvl5pPr marL="1828800" indent="0" algn="ctr" defTabSz="914400" rtl="0" eaLnBrk="1" latinLnBrk="0" hangingPunct="1">
+              <a:spcBef>
+                <a:spcPct val="20000"/>
+              </a:spcBef>
+              <a:buFont typeface="Arial" pitchFamily="34" charset="0"/>
+              <a:buNone/>
+              <a:defRPr sz="2000" kern="1200">
+                <a:solidFill>
+                  <a:schemeClr val="tx1">
+                    <a:tint val="75000"/>
+                  </a:schemeClr>
+                </a:solidFill>
+                <a:latin typeface="+mn-lt"/>
+                <a:ea typeface="+mn-ea"/>
+                <a:cs typeface="+mn-cs"/>
+              </a:defRPr>
+            </a:lvl5pPr>
+            <a:lvl6pPr marL="2286000" indent="0" algn="ctr" defTabSz="914400" rtl="0" eaLnBrk="1" latinLnBrk="0" hangingPunct="1">
+              <a:spcBef>
+                <a:spcPct val="20000"/>
+              </a:spcBef>
+              <a:buFont typeface="Arial" pitchFamily="34" charset="0"/>
+              <a:buNone/>
+              <a:defRPr sz="2000" kern="1200">
+                <a:solidFill>
+                  <a:schemeClr val="tx1">
+                    <a:tint val="75000"/>
+                  </a:schemeClr>
+                </a:solidFill>
+                <a:latin typeface="+mn-lt"/>
+                <a:ea typeface="+mn-ea"/>
+                <a:cs typeface="+mn-cs"/>
+              </a:defRPr>
+            </a:lvl6pPr>
+            <a:lvl7pPr marL="2743200" indent="0" algn="ctr" defTabSz="914400" rtl="0" eaLnBrk="1" latinLnBrk="0" hangingPunct="1">
+              <a:spcBef>
+                <a:spcPct val="20000"/>
+              </a:spcBef>
+              <a:buFont typeface="Arial" pitchFamily="34" charset="0"/>
+              <a:buNone/>
+              <a:defRPr sz="2000" kern="1200">
+                <a:solidFill>
+                  <a:schemeClr val="tx1">
+                    <a:tint val="75000"/>
+                  </a:schemeClr>
+                </a:solidFill>
+                <a:latin typeface="+mn-lt"/>
+                <a:ea typeface="+mn-ea"/>
+                <a:cs typeface="+mn-cs"/>
+              </a:defRPr>
+            </a:lvl7pPr>
+            <a:lvl8pPr marL="3200400" indent="0" algn="ctr" defTabSz="914400" rtl="0" eaLnBrk="1" latinLnBrk="0" hangingPunct="1">
+              <a:spcBef>
+                <a:spcPct val="20000"/>
+              </a:spcBef>
+              <a:buFont typeface="Arial" pitchFamily="34" charset="0"/>
+              <a:buNone/>
+              <a:defRPr sz="2000" kern="1200">
+                <a:solidFill>
+                  <a:schemeClr val="tx1">
+                    <a:tint val="75000"/>
+                  </a:schemeClr>
+                </a:solidFill>
+                <a:latin typeface="+mn-lt"/>
+                <a:ea typeface="+mn-ea"/>
+                <a:cs typeface="+mn-cs"/>
+              </a:defRPr>
+            </a:lvl8pPr>
+            <a:lvl9pPr marL="3657600" indent="0" algn="ctr" defTabSz="914400" rtl="0" eaLnBrk="1" latinLnBrk="0" hangingPunct="1">
+              <a:spcBef>
+                <a:spcPct val="20000"/>
+              </a:spcBef>
+              <a:buFont typeface="Arial" pitchFamily="34" charset="0"/>
+              <a:buNone/>
+              <a:defRPr sz="2000" kern="1200">
+                <a:solidFill>
+                  <a:schemeClr val="tx1">
+                    <a:tint val="75000"/>
+                  </a:schemeClr>
+                </a:solidFill>
+                <a:latin typeface="+mn-lt"/>
+                <a:ea typeface="+mn-ea"/>
+                <a:cs typeface="+mn-cs"/>
+              </a:defRPr>
+            </a:lvl9pPr>
+          </a:lstStyle>
+          <a:p>
+            <a:pPr marL="0" lvl="1" algn="l"/>
+            <a:r>
+              <a:rPr lang="en-US" dirty="0" smtClean="0"/>
+              <a:t>Set up new connection</a:t>
+            </a:r>
+          </a:p>
+          <a:p>
+            <a:pPr marL="0" lvl="1" algn="l"/>
+            <a:r>
+              <a:rPr lang="en-US" dirty="0" smtClean="0"/>
+              <a:t>Send query to dB</a:t>
+            </a:r>
+          </a:p>
+          <a:p>
+            <a:pPr marL="0" lvl="1" algn="l"/>
+            <a:r>
+              <a:rPr lang="en-US" dirty="0" smtClean="0"/>
+              <a:t>             (wait)</a:t>
+            </a:r>
+          </a:p>
+          <a:p>
+            <a:pPr marL="0" lvl="1" algn="l"/>
+            <a:r>
+              <a:rPr lang="en-US" dirty="0" smtClean="0"/>
+              <a:t>	|</a:t>
+            </a:r>
+          </a:p>
+          <a:p>
+            <a:pPr marL="0" lvl="1" algn="l"/>
+            <a:r>
+              <a:rPr lang="en-US" dirty="0" smtClean="0"/>
+              <a:t>	V</a:t>
+            </a:r>
+          </a:p>
+          <a:p>
+            <a:pPr marL="0" lvl="1" algn="l"/>
+            <a:r>
+              <a:rPr lang="en-US" dirty="0" smtClean="0"/>
+              <a:t>Process query results</a:t>
+            </a:r>
+          </a:p>
+          <a:p>
+            <a:pPr marL="0" lvl="1" algn="l"/>
+            <a:r>
+              <a:rPr lang="en-US" dirty="0" smtClean="0"/>
+              <a:t>Business logic</a:t>
+            </a:r>
+          </a:p>
+          <a:p>
+            <a:pPr marL="0" lvl="1" algn="l"/>
+            <a:r>
+              <a:rPr lang="en-US" dirty="0" smtClean="0"/>
+              <a:t>Call a web service</a:t>
+            </a:r>
+          </a:p>
+          <a:p>
+            <a:pPr marL="0" lvl="1" algn="l"/>
+            <a:r>
+              <a:rPr lang="en-US" dirty="0" smtClean="0"/>
+              <a:t>             (wait)</a:t>
+            </a:r>
+          </a:p>
+          <a:p>
+            <a:pPr marL="0" lvl="1" algn="l"/>
+            <a:r>
+              <a:rPr lang="en-US" dirty="0" smtClean="0"/>
+              <a:t>	|</a:t>
+            </a:r>
+          </a:p>
+          <a:p>
+            <a:pPr marL="0" lvl="1" algn="l"/>
+            <a:r>
+              <a:rPr lang="en-US" dirty="0" smtClean="0"/>
+              <a:t>	|</a:t>
+            </a:r>
+          </a:p>
+          <a:p>
+            <a:pPr marL="0" lvl="1" algn="l"/>
+            <a:r>
+              <a:rPr lang="en-US" dirty="0" smtClean="0"/>
+              <a:t>	V</a:t>
+            </a:r>
+          </a:p>
+          <a:p>
+            <a:pPr marL="0" lvl="1" algn="l"/>
+            <a:r>
+              <a:rPr lang="en-US" dirty="0" smtClean="0"/>
+              <a:t>Process results</a:t>
+            </a:r>
+          </a:p>
+          <a:p>
+            <a:pPr marL="0" lvl="1" algn="l"/>
+            <a:r>
+              <a:rPr lang="en-US" dirty="0" smtClean="0"/>
+              <a:t>Send to network</a:t>
+            </a:r>
+          </a:p>
+          <a:p>
+            <a:pPr marL="0" lvl="1" algn="l"/>
+            <a:r>
+              <a:rPr lang="en-US" dirty="0" smtClean="0"/>
+              <a:t>              (end)</a:t>
+            </a:r>
+          </a:p>
+          <a:p>
+            <a:pPr marL="0" lvl="1" algn="l"/>
+            <a:endParaRPr lang="en-US" dirty="0" smtClean="0"/>
+          </a:p>
+        </p:txBody>
+      </p:sp>
+      <p:sp>
+        <p:nvSpPr>
+          <p:cNvPr id="5" name="Subtitle 2"/>
+          <p:cNvSpPr txBox="1">
+            <a:spLocks/>
+          </p:cNvSpPr>
+          <p:nvPr/>
+        </p:nvSpPr>
+        <p:spPr>
+          <a:xfrm>
+            <a:off x="4820449" y="2638738"/>
+            <a:ext cx="2474686" cy="4912370"/>
+          </a:xfrm>
+          <a:prstGeom prst="rect">
+            <a:avLst/>
+          </a:prstGeom>
+        </p:spPr>
+        <p:txBody>
+          <a:bodyPr vert="horz" lIns="91440" tIns="45720" rIns="91440" bIns="45720" rtlCol="0">
+            <a:normAutofit fontScale="62500" lnSpcReduction="20000"/>
+          </a:bodyPr>
+          <a:lstStyle>
+            <a:lvl1pPr marL="0" indent="0" algn="ctr" defTabSz="914400" rtl="0" eaLnBrk="1" latinLnBrk="0" hangingPunct="1">
+              <a:spcBef>
+                <a:spcPct val="20000"/>
+              </a:spcBef>
+              <a:buFont typeface="Arial" pitchFamily="34" charset="0"/>
+              <a:buNone/>
+              <a:defRPr sz="3200" kern="1200">
+                <a:solidFill>
+                  <a:schemeClr val="tx1">
+                    <a:tint val="75000"/>
+                  </a:schemeClr>
+                </a:solidFill>
+                <a:latin typeface="+mn-lt"/>
+                <a:ea typeface="+mn-ea"/>
+                <a:cs typeface="+mn-cs"/>
+              </a:defRPr>
+            </a:lvl1pPr>
+            <a:lvl2pPr marL="457200" indent="0" algn="ctr" defTabSz="914400" rtl="0" eaLnBrk="1" latinLnBrk="0" hangingPunct="1">
+              <a:spcBef>
+                <a:spcPct val="20000"/>
+              </a:spcBef>
+              <a:buFont typeface="Arial" pitchFamily="34" charset="0"/>
+              <a:buNone/>
+              <a:defRPr sz="2800" kern="1200">
+                <a:solidFill>
+                  <a:schemeClr val="tx1">
+                    <a:tint val="75000"/>
+                  </a:schemeClr>
+                </a:solidFill>
+                <a:latin typeface="+mn-lt"/>
+                <a:ea typeface="+mn-ea"/>
+                <a:cs typeface="+mn-cs"/>
+              </a:defRPr>
+            </a:lvl2pPr>
+            <a:lvl3pPr marL="914400" indent="0" algn="ctr" defTabSz="914400" rtl="0" eaLnBrk="1" latinLnBrk="0" hangingPunct="1">
+              <a:spcBef>
+                <a:spcPct val="20000"/>
+              </a:spcBef>
+              <a:buFont typeface="Arial" pitchFamily="34" charset="0"/>
+              <a:buNone/>
+              <a:defRPr sz="2400" kern="1200">
+                <a:solidFill>
+                  <a:schemeClr val="tx1">
+                    <a:tint val="75000"/>
+                  </a:schemeClr>
+                </a:solidFill>
+                <a:latin typeface="+mn-lt"/>
+                <a:ea typeface="+mn-ea"/>
+                <a:cs typeface="+mn-cs"/>
+              </a:defRPr>
+            </a:lvl3pPr>
+            <a:lvl4pPr marL="1371600" indent="0" algn="ctr" defTabSz="914400" rtl="0" eaLnBrk="1" latinLnBrk="0" hangingPunct="1">
+              <a:spcBef>
+                <a:spcPct val="20000"/>
+              </a:spcBef>
+              <a:buFont typeface="Arial" pitchFamily="34" charset="0"/>
+              <a:buNone/>
+              <a:defRPr sz="2000" kern="1200">
+                <a:solidFill>
+                  <a:schemeClr val="tx1">
+                    <a:tint val="75000"/>
+                  </a:schemeClr>
+                </a:solidFill>
+                <a:latin typeface="+mn-lt"/>
+                <a:ea typeface="+mn-ea"/>
+                <a:cs typeface="+mn-cs"/>
+              </a:defRPr>
+            </a:lvl4pPr>
+            <a:lvl5pPr marL="1828800" indent="0" algn="ctr" defTabSz="914400" rtl="0" eaLnBrk="1" latinLnBrk="0" hangingPunct="1">
+              <a:spcBef>
+                <a:spcPct val="20000"/>
+              </a:spcBef>
+              <a:buFont typeface="Arial" pitchFamily="34" charset="0"/>
+              <a:buNone/>
+              <a:defRPr sz="2000" kern="1200">
+                <a:solidFill>
+                  <a:schemeClr val="tx1">
+                    <a:tint val="75000"/>
+                  </a:schemeClr>
+                </a:solidFill>
+                <a:latin typeface="+mn-lt"/>
+                <a:ea typeface="+mn-ea"/>
+                <a:cs typeface="+mn-cs"/>
+              </a:defRPr>
+            </a:lvl5pPr>
+            <a:lvl6pPr marL="2286000" indent="0" algn="ctr" defTabSz="914400" rtl="0" eaLnBrk="1" latinLnBrk="0" hangingPunct="1">
+              <a:spcBef>
+                <a:spcPct val="20000"/>
+              </a:spcBef>
+              <a:buFont typeface="Arial" pitchFamily="34" charset="0"/>
+              <a:buNone/>
+              <a:defRPr sz="2000" kern="1200">
+                <a:solidFill>
+                  <a:schemeClr val="tx1">
+                    <a:tint val="75000"/>
+                  </a:schemeClr>
+                </a:solidFill>
+                <a:latin typeface="+mn-lt"/>
+                <a:ea typeface="+mn-ea"/>
+                <a:cs typeface="+mn-cs"/>
+              </a:defRPr>
+            </a:lvl6pPr>
+            <a:lvl7pPr marL="2743200" indent="0" algn="ctr" defTabSz="914400" rtl="0" eaLnBrk="1" latinLnBrk="0" hangingPunct="1">
+              <a:spcBef>
+                <a:spcPct val="20000"/>
+              </a:spcBef>
+              <a:buFont typeface="Arial" pitchFamily="34" charset="0"/>
+              <a:buNone/>
+              <a:defRPr sz="2000" kern="1200">
+                <a:solidFill>
+                  <a:schemeClr val="tx1">
+                    <a:tint val="75000"/>
+                  </a:schemeClr>
+                </a:solidFill>
+                <a:latin typeface="+mn-lt"/>
+                <a:ea typeface="+mn-ea"/>
+                <a:cs typeface="+mn-cs"/>
+              </a:defRPr>
+            </a:lvl7pPr>
+            <a:lvl8pPr marL="3200400" indent="0" algn="ctr" defTabSz="914400" rtl="0" eaLnBrk="1" latinLnBrk="0" hangingPunct="1">
+              <a:spcBef>
+                <a:spcPct val="20000"/>
+              </a:spcBef>
+              <a:buFont typeface="Arial" pitchFamily="34" charset="0"/>
+              <a:buNone/>
+              <a:defRPr sz="2000" kern="1200">
+                <a:solidFill>
+                  <a:schemeClr val="tx1">
+                    <a:tint val="75000"/>
+                  </a:schemeClr>
+                </a:solidFill>
+                <a:latin typeface="+mn-lt"/>
+                <a:ea typeface="+mn-ea"/>
+                <a:cs typeface="+mn-cs"/>
+              </a:defRPr>
+            </a:lvl8pPr>
+            <a:lvl9pPr marL="3657600" indent="0" algn="ctr" defTabSz="914400" rtl="0" eaLnBrk="1" latinLnBrk="0" hangingPunct="1">
+              <a:spcBef>
+                <a:spcPct val="20000"/>
+              </a:spcBef>
+              <a:buFont typeface="Arial" pitchFamily="34" charset="0"/>
+              <a:buNone/>
+              <a:defRPr sz="2000" kern="1200">
+                <a:solidFill>
+                  <a:schemeClr val="tx1">
+                    <a:tint val="75000"/>
+                  </a:schemeClr>
+                </a:solidFill>
+                <a:latin typeface="+mn-lt"/>
+                <a:ea typeface="+mn-ea"/>
+                <a:cs typeface="+mn-cs"/>
+              </a:defRPr>
+            </a:lvl9pPr>
+          </a:lstStyle>
+          <a:p>
+            <a:pPr marL="0" lvl="1" algn="l"/>
+            <a:r>
+              <a:rPr lang="en-US" dirty="0" smtClean="0"/>
+              <a:t>Set up new connection</a:t>
+            </a:r>
+          </a:p>
+          <a:p>
+            <a:pPr marL="0" lvl="1" algn="l"/>
+            <a:r>
+              <a:rPr lang="en-US" dirty="0" smtClean="0"/>
+              <a:t>Send query to dB</a:t>
+            </a:r>
+          </a:p>
+          <a:p>
+            <a:pPr marL="0" lvl="1" algn="l"/>
+            <a:r>
+              <a:rPr lang="en-US" dirty="0" smtClean="0"/>
+              <a:t>             (wait)</a:t>
+            </a:r>
+          </a:p>
+          <a:p>
+            <a:pPr marL="0" lvl="1" algn="l"/>
+            <a:r>
+              <a:rPr lang="en-US" dirty="0"/>
+              <a:t>	|</a:t>
+            </a:r>
+          </a:p>
+          <a:p>
+            <a:pPr marL="0" lvl="1" algn="l"/>
+            <a:r>
+              <a:rPr lang="en-US" dirty="0" smtClean="0"/>
+              <a:t>	|</a:t>
+            </a:r>
+          </a:p>
+          <a:p>
+            <a:pPr marL="0" lvl="1" algn="l"/>
+            <a:r>
+              <a:rPr lang="en-US" dirty="0" smtClean="0"/>
+              <a:t>	|</a:t>
+            </a:r>
+          </a:p>
+          <a:p>
+            <a:pPr marL="0" lvl="1" algn="l"/>
+            <a:r>
+              <a:rPr lang="en-US" dirty="0" smtClean="0"/>
+              <a:t>	V</a:t>
+            </a:r>
+          </a:p>
+          <a:p>
+            <a:pPr marL="0" lvl="1" algn="l"/>
+            <a:r>
+              <a:rPr lang="en-US" dirty="0" smtClean="0"/>
+              <a:t>Process query results</a:t>
+            </a:r>
+          </a:p>
+          <a:p>
+            <a:pPr marL="0" lvl="1" algn="l"/>
+            <a:r>
+              <a:rPr lang="en-US" dirty="0" smtClean="0"/>
+              <a:t>Business logic</a:t>
+            </a:r>
+          </a:p>
+          <a:p>
+            <a:pPr marL="0" lvl="1" algn="l"/>
+            <a:r>
+              <a:rPr lang="en-US" dirty="0" smtClean="0"/>
+              <a:t>Call a web service</a:t>
+            </a:r>
+          </a:p>
+          <a:p>
+            <a:pPr marL="0" lvl="1" algn="l"/>
+            <a:r>
+              <a:rPr lang="en-US" dirty="0" smtClean="0"/>
+              <a:t>             (wait)</a:t>
+            </a:r>
+          </a:p>
+          <a:p>
+            <a:pPr marL="0" lvl="1" algn="l"/>
+            <a:r>
+              <a:rPr lang="en-US" dirty="0" smtClean="0"/>
+              <a:t>	|</a:t>
+            </a:r>
+          </a:p>
+          <a:p>
+            <a:pPr marL="0" lvl="1" algn="l"/>
+            <a:r>
+              <a:rPr lang="en-US" dirty="0" smtClean="0"/>
+              <a:t>	V</a:t>
+            </a:r>
+          </a:p>
+          <a:p>
+            <a:pPr marL="0" lvl="1" algn="l"/>
+            <a:r>
+              <a:rPr lang="en-US" dirty="0" smtClean="0"/>
+              <a:t>Process results</a:t>
+            </a:r>
+          </a:p>
+          <a:p>
+            <a:pPr marL="0" lvl="1" algn="l"/>
+            <a:r>
+              <a:rPr lang="en-US" dirty="0" smtClean="0"/>
+              <a:t>Send to network</a:t>
+            </a:r>
+          </a:p>
+          <a:p>
+            <a:pPr marL="0" lvl="1" algn="l"/>
+            <a:r>
+              <a:rPr lang="en-US" dirty="0" smtClean="0"/>
+              <a:t>              (end)</a:t>
+            </a:r>
+          </a:p>
+          <a:p>
+            <a:pPr marL="0" lvl="1" algn="l"/>
+            <a:endParaRPr lang="en-US" dirty="0" smtClean="0"/>
+          </a:p>
+        </p:txBody>
+      </p:sp>
+      <p:sp>
+        <p:nvSpPr>
+          <p:cNvPr id="6" name="Subtitle 2"/>
+          <p:cNvSpPr txBox="1">
+            <a:spLocks/>
+          </p:cNvSpPr>
+          <p:nvPr/>
+        </p:nvSpPr>
+        <p:spPr>
+          <a:xfrm>
+            <a:off x="7050888" y="3290621"/>
+            <a:ext cx="2474686" cy="4609893"/>
+          </a:xfrm>
+          <a:prstGeom prst="rect">
+            <a:avLst/>
+          </a:prstGeom>
+        </p:spPr>
+        <p:txBody>
+          <a:bodyPr vert="horz" lIns="91440" tIns="45720" rIns="91440" bIns="45720" rtlCol="0">
+            <a:noAutofit/>
+          </a:bodyPr>
+          <a:lstStyle>
+            <a:lvl1pPr marL="0" indent="0" algn="ctr" defTabSz="914400" rtl="0" eaLnBrk="1" latinLnBrk="0" hangingPunct="1">
+              <a:spcBef>
+                <a:spcPct val="20000"/>
+              </a:spcBef>
+              <a:buFont typeface="Arial" pitchFamily="34" charset="0"/>
+              <a:buNone/>
+              <a:defRPr sz="3200" kern="1200">
+                <a:solidFill>
+                  <a:schemeClr val="tx1">
+                    <a:tint val="75000"/>
+                  </a:schemeClr>
+                </a:solidFill>
+                <a:latin typeface="+mn-lt"/>
+                <a:ea typeface="+mn-ea"/>
+                <a:cs typeface="+mn-cs"/>
+              </a:defRPr>
+            </a:lvl1pPr>
+            <a:lvl2pPr marL="457200" indent="0" algn="ctr" defTabSz="914400" rtl="0" eaLnBrk="1" latinLnBrk="0" hangingPunct="1">
+              <a:spcBef>
+                <a:spcPct val="20000"/>
+              </a:spcBef>
+              <a:buFont typeface="Arial" pitchFamily="34" charset="0"/>
+              <a:buNone/>
+              <a:defRPr sz="2800" kern="1200">
+                <a:solidFill>
+                  <a:schemeClr val="tx1">
+                    <a:tint val="75000"/>
+                  </a:schemeClr>
+                </a:solidFill>
+                <a:latin typeface="+mn-lt"/>
+                <a:ea typeface="+mn-ea"/>
+                <a:cs typeface="+mn-cs"/>
+              </a:defRPr>
+            </a:lvl2pPr>
+            <a:lvl3pPr marL="914400" indent="0" algn="ctr" defTabSz="914400" rtl="0" eaLnBrk="1" latinLnBrk="0" hangingPunct="1">
+              <a:spcBef>
+                <a:spcPct val="20000"/>
+              </a:spcBef>
+              <a:buFont typeface="Arial" pitchFamily="34" charset="0"/>
+              <a:buNone/>
+              <a:defRPr sz="2400" kern="1200">
+                <a:solidFill>
+                  <a:schemeClr val="tx1">
+                    <a:tint val="75000"/>
+                  </a:schemeClr>
+                </a:solidFill>
+                <a:latin typeface="+mn-lt"/>
+                <a:ea typeface="+mn-ea"/>
+                <a:cs typeface="+mn-cs"/>
+              </a:defRPr>
+            </a:lvl3pPr>
+            <a:lvl4pPr marL="1371600" indent="0" algn="ctr" defTabSz="914400" rtl="0" eaLnBrk="1" latinLnBrk="0" hangingPunct="1">
+              <a:spcBef>
+                <a:spcPct val="20000"/>
+              </a:spcBef>
+              <a:buFont typeface="Arial" pitchFamily="34" charset="0"/>
+              <a:buNone/>
+              <a:defRPr sz="2000" kern="1200">
+                <a:solidFill>
+                  <a:schemeClr val="tx1">
+                    <a:tint val="75000"/>
+                  </a:schemeClr>
+                </a:solidFill>
+                <a:latin typeface="+mn-lt"/>
+                <a:ea typeface="+mn-ea"/>
+                <a:cs typeface="+mn-cs"/>
+              </a:defRPr>
+            </a:lvl4pPr>
+            <a:lvl5pPr marL="1828800" indent="0" algn="ctr" defTabSz="914400" rtl="0" eaLnBrk="1" latinLnBrk="0" hangingPunct="1">
+              <a:spcBef>
+                <a:spcPct val="20000"/>
+              </a:spcBef>
+              <a:buFont typeface="Arial" pitchFamily="34" charset="0"/>
+              <a:buNone/>
+              <a:defRPr sz="2000" kern="1200">
+                <a:solidFill>
+                  <a:schemeClr val="tx1">
+                    <a:tint val="75000"/>
+                  </a:schemeClr>
+                </a:solidFill>
+                <a:latin typeface="+mn-lt"/>
+                <a:ea typeface="+mn-ea"/>
+                <a:cs typeface="+mn-cs"/>
+              </a:defRPr>
+            </a:lvl5pPr>
+            <a:lvl6pPr marL="2286000" indent="0" algn="ctr" defTabSz="914400" rtl="0" eaLnBrk="1" latinLnBrk="0" hangingPunct="1">
+              <a:spcBef>
+                <a:spcPct val="20000"/>
+              </a:spcBef>
+              <a:buFont typeface="Arial" pitchFamily="34" charset="0"/>
+              <a:buNone/>
+              <a:defRPr sz="2000" kern="1200">
+                <a:solidFill>
+                  <a:schemeClr val="tx1">
+                    <a:tint val="75000"/>
+                  </a:schemeClr>
+                </a:solidFill>
+                <a:latin typeface="+mn-lt"/>
+                <a:ea typeface="+mn-ea"/>
+                <a:cs typeface="+mn-cs"/>
+              </a:defRPr>
+            </a:lvl6pPr>
+            <a:lvl7pPr marL="2743200" indent="0" algn="ctr" defTabSz="914400" rtl="0" eaLnBrk="1" latinLnBrk="0" hangingPunct="1">
+              <a:spcBef>
+                <a:spcPct val="20000"/>
+              </a:spcBef>
+              <a:buFont typeface="Arial" pitchFamily="34" charset="0"/>
+              <a:buNone/>
+              <a:defRPr sz="2000" kern="1200">
+                <a:solidFill>
+                  <a:schemeClr val="tx1">
+                    <a:tint val="75000"/>
+                  </a:schemeClr>
+                </a:solidFill>
+                <a:latin typeface="+mn-lt"/>
+                <a:ea typeface="+mn-ea"/>
+                <a:cs typeface="+mn-cs"/>
+              </a:defRPr>
+            </a:lvl7pPr>
+            <a:lvl8pPr marL="3200400" indent="0" algn="ctr" defTabSz="914400" rtl="0" eaLnBrk="1" latinLnBrk="0" hangingPunct="1">
+              <a:spcBef>
+                <a:spcPct val="20000"/>
+              </a:spcBef>
+              <a:buFont typeface="Arial" pitchFamily="34" charset="0"/>
+              <a:buNone/>
+              <a:defRPr sz="2000" kern="1200">
+                <a:solidFill>
+                  <a:schemeClr val="tx1">
+                    <a:tint val="75000"/>
+                  </a:schemeClr>
+                </a:solidFill>
+                <a:latin typeface="+mn-lt"/>
+                <a:ea typeface="+mn-ea"/>
+                <a:cs typeface="+mn-cs"/>
+              </a:defRPr>
+            </a:lvl8pPr>
+            <a:lvl9pPr marL="3657600" indent="0" algn="ctr" defTabSz="914400" rtl="0" eaLnBrk="1" latinLnBrk="0" hangingPunct="1">
+              <a:spcBef>
+                <a:spcPct val="20000"/>
+              </a:spcBef>
+              <a:buFont typeface="Arial" pitchFamily="34" charset="0"/>
+              <a:buNone/>
+              <a:defRPr sz="2000" kern="1200">
+                <a:solidFill>
+                  <a:schemeClr val="tx1">
+                    <a:tint val="75000"/>
+                  </a:schemeClr>
+                </a:solidFill>
+                <a:latin typeface="+mn-lt"/>
+                <a:ea typeface="+mn-ea"/>
+                <a:cs typeface="+mn-cs"/>
+              </a:defRPr>
+            </a:lvl9pPr>
+          </a:lstStyle>
+          <a:p>
+            <a:pPr marL="0" lvl="1" algn="l"/>
+            <a:r>
+              <a:rPr lang="en-US" sz="1800" dirty="0" smtClean="0"/>
+              <a:t>Set up new connection</a:t>
+            </a:r>
+          </a:p>
+          <a:p>
+            <a:pPr marL="0" lvl="1" algn="l"/>
+            <a:r>
+              <a:rPr lang="en-US" sz="1800" dirty="0" smtClean="0"/>
+              <a:t>Send query to dB</a:t>
+            </a:r>
+          </a:p>
+          <a:p>
+            <a:pPr marL="0" lvl="1" algn="l"/>
+            <a:r>
+              <a:rPr lang="en-US" sz="1800" dirty="0" smtClean="0"/>
+              <a:t>             (wait)</a:t>
+            </a:r>
+          </a:p>
+          <a:p>
+            <a:pPr marL="0" lvl="1" algn="l"/>
+            <a:r>
+              <a:rPr lang="en-US" sz="1800" dirty="0" smtClean="0"/>
+              <a:t>	V</a:t>
+            </a:r>
+          </a:p>
+          <a:p>
+            <a:pPr marL="0" lvl="1" algn="l"/>
+            <a:r>
+              <a:rPr lang="en-US" sz="1800" dirty="0" smtClean="0"/>
+              <a:t>Process query results</a:t>
+            </a:r>
+          </a:p>
+          <a:p>
+            <a:pPr marL="0" lvl="1" algn="l"/>
+            <a:r>
+              <a:rPr lang="en-US" sz="1800" dirty="0" smtClean="0"/>
+              <a:t>Business logic</a:t>
+            </a:r>
+          </a:p>
+          <a:p>
+            <a:pPr marL="0" lvl="1" algn="l"/>
+            <a:r>
+              <a:rPr lang="en-US" sz="1800" dirty="0" smtClean="0"/>
+              <a:t>Call a web service</a:t>
+            </a:r>
+          </a:p>
+          <a:p>
+            <a:pPr marL="0" lvl="1" algn="l"/>
+            <a:r>
+              <a:rPr lang="en-US" sz="1800" dirty="0" smtClean="0"/>
+              <a:t>             (wait)</a:t>
+            </a:r>
+          </a:p>
+          <a:p>
+            <a:pPr marL="0" lvl="1" algn="l"/>
+            <a:r>
+              <a:rPr lang="en-US" sz="1800" dirty="0" smtClean="0"/>
+              <a:t>	V</a:t>
+            </a:r>
+          </a:p>
+          <a:p>
+            <a:pPr marL="0" lvl="1" algn="l"/>
+            <a:r>
+              <a:rPr lang="en-US" sz="1800" dirty="0" smtClean="0"/>
+              <a:t>Process results</a:t>
+            </a:r>
+          </a:p>
+          <a:p>
+            <a:pPr marL="0" lvl="1" algn="l"/>
+            <a:r>
+              <a:rPr lang="en-US" sz="1800" dirty="0" smtClean="0"/>
+              <a:t>Send to network</a:t>
+            </a:r>
+          </a:p>
+          <a:p>
+            <a:pPr marL="0" lvl="1" algn="l"/>
+            <a:r>
+              <a:rPr lang="en-US" sz="1800" dirty="0" smtClean="0"/>
+              <a:t>              (end)</a:t>
+            </a:r>
+          </a:p>
+          <a:p>
+            <a:pPr marL="0" lvl="1" algn="l"/>
+            <a:endParaRPr lang="en-US" sz="1800" dirty="0" smtClean="0"/>
+          </a:p>
+        </p:txBody>
+      </p:sp>
+      <p:sp>
+        <p:nvSpPr>
+          <p:cNvPr id="7" name="TextBox 6"/>
+          <p:cNvSpPr txBox="1"/>
+          <p:nvPr/>
+        </p:nvSpPr>
+        <p:spPr>
+          <a:xfrm>
+            <a:off x="831943" y="1281304"/>
+            <a:ext cx="1185829" cy="523220"/>
+          </a:xfrm>
+          <a:prstGeom prst="rect">
+            <a:avLst/>
+          </a:prstGeom>
+          <a:noFill/>
+        </p:spPr>
+        <p:txBody>
+          <a:bodyPr wrap="none" rtlCol="0">
+            <a:spAutoFit/>
+          </a:bodyPr>
+          <a:lstStyle/>
+          <a:p>
+            <a:r>
+              <a:rPr lang="en-US" sz="2800" dirty="0" smtClean="0"/>
+              <a:t>Time</a:t>
+            </a:r>
+            <a:r>
+              <a:rPr lang="en-US" dirty="0" smtClean="0"/>
+              <a:t> </a:t>
+            </a:r>
+            <a:r>
+              <a:rPr lang="en-US" dirty="0" smtClean="0">
+                <a:sym typeface="Wingdings"/>
+              </a:rPr>
+              <a:t></a:t>
+            </a:r>
+            <a:endParaRPr lang="en-US" dirty="0"/>
+          </a:p>
+        </p:txBody>
+      </p:sp>
+      <p:sp>
+        <p:nvSpPr>
+          <p:cNvPr id="9" name="TextBox 8"/>
+          <p:cNvSpPr txBox="1"/>
+          <p:nvPr/>
+        </p:nvSpPr>
+        <p:spPr>
+          <a:xfrm rot="5400000">
+            <a:off x="-513657" y="2108017"/>
+            <a:ext cx="2031501" cy="523220"/>
+          </a:xfrm>
+          <a:prstGeom prst="rect">
+            <a:avLst/>
+          </a:prstGeom>
+          <a:noFill/>
+        </p:spPr>
+        <p:txBody>
+          <a:bodyPr wrap="none" rtlCol="0">
+            <a:spAutoFit/>
+          </a:bodyPr>
+          <a:lstStyle/>
+          <a:p>
+            <a:r>
+              <a:rPr lang="en-US" sz="2800" dirty="0" smtClean="0"/>
+              <a:t>Operations</a:t>
+            </a:r>
+            <a:r>
+              <a:rPr lang="en-US" dirty="0" smtClean="0">
+                <a:sym typeface="Wingdings"/>
+              </a:rPr>
+              <a:t></a:t>
+            </a:r>
+            <a:endParaRPr lang="en-US" dirty="0"/>
+          </a:p>
+        </p:txBody>
+      </p:sp>
+    </p:spTree>
+    <p:extLst>
+      <p:ext uri="{BB962C8B-B14F-4D97-AF65-F5344CB8AC3E}">
+        <p14:creationId xmlns:p14="http://schemas.microsoft.com/office/powerpoint/2010/main" val="3797153266"/>
+      </p:ext>
+    </p:extLst>
+  </p:cSld>
+  <p:clrMapOvr>
+    <a:masterClrMapping/>
+  </p:clrMapOvr>
+</p:sld>
+</file>
+
+<file path=ppt/slides/slide46.xml><?xml version="1.0" encoding="utf-8"?>
+<p:sld xmlns:a="http://schemas.openxmlformats.org/drawingml/2006/main" xmlns:r="http://schemas.openxmlformats.org/officeDocument/2006/relationships" xmlns:p="http://schemas.openxmlformats.org/presentationml/2006/main">
+  <p:cSld>
+    <p:spTree>
+      <p:nvGrpSpPr>
+        <p:cNvPr id="1" name=""/>
+        <p:cNvGrpSpPr/>
+        <p:nvPr/>
+      </p:nvGrpSpPr>
+      <p:grpSpPr>
+        <a:xfrm>
+          <a:off x="0" y="0"/>
+          <a:ext cx="0" cy="0"/>
+          <a:chOff x="0" y="0"/>
+          <a:chExt cx="0" cy="0"/>
+        </a:xfrm>
+      </p:grpSpPr>
+      <p:sp>
+        <p:nvSpPr>
+          <p:cNvPr id="2" name="Title 1"/>
+          <p:cNvSpPr>
+            <a:spLocks noGrp="1"/>
+          </p:cNvSpPr>
+          <p:nvPr>
+            <p:ph type="ctrTitle"/>
+          </p:nvPr>
+        </p:nvSpPr>
+        <p:spPr>
+          <a:xfrm>
+            <a:off x="685800" y="160685"/>
+            <a:ext cx="7772400" cy="1470025"/>
+          </a:xfrm>
+        </p:spPr>
+        <p:txBody>
+          <a:bodyPr/>
+          <a:lstStyle/>
+          <a:p>
+            <a:r>
+              <a:rPr lang="en-US" dirty="0" err="1" smtClean="0"/>
+              <a:t>Node.js</a:t>
+            </a:r>
+            <a:r>
+              <a:rPr lang="en-US" dirty="0" smtClean="0"/>
+              <a:t> architecture</a:t>
+            </a:r>
+            <a:endParaRPr lang="en-US" dirty="0"/>
+          </a:p>
+        </p:txBody>
+      </p:sp>
+      <p:sp>
+        <p:nvSpPr>
+          <p:cNvPr id="3" name="Subtitle 2"/>
+          <p:cNvSpPr>
+            <a:spLocks noGrp="1"/>
+          </p:cNvSpPr>
+          <p:nvPr>
+            <p:ph type="subTitle" idx="1"/>
+          </p:nvPr>
+        </p:nvSpPr>
+        <p:spPr>
+          <a:xfrm>
+            <a:off x="1371600" y="1630710"/>
+            <a:ext cx="6400800" cy="4609893"/>
+          </a:xfrm>
+        </p:spPr>
+        <p:txBody>
+          <a:bodyPr>
+            <a:normAutofit/>
+          </a:bodyPr>
+          <a:lstStyle/>
+          <a:p>
+            <a:pPr marL="0" lvl="1" algn="l"/>
+            <a:r>
+              <a:rPr lang="en-US" dirty="0" smtClean="0"/>
+              <a:t>Why </a:t>
+            </a:r>
+            <a:r>
+              <a:rPr lang="en-US" dirty="0" err="1" smtClean="0"/>
+              <a:t>Node.js</a:t>
+            </a:r>
+            <a:r>
+              <a:rPr lang="en-US" dirty="0" smtClean="0"/>
+              <a:t>?</a:t>
+            </a:r>
+          </a:p>
+          <a:p>
+            <a:pPr lvl="1" indent="-457200" algn="l">
+              <a:buFont typeface="Arial"/>
+              <a:buChar char="•"/>
+            </a:pPr>
+            <a:r>
+              <a:rPr lang="en-US" dirty="0" smtClean="0"/>
+              <a:t>Several ways to handle load</a:t>
+            </a:r>
+          </a:p>
+          <a:p>
+            <a:pPr lvl="2" indent="-457200" algn="l">
+              <a:buFont typeface="Arial"/>
+              <a:buChar char="•"/>
+            </a:pPr>
+            <a:r>
+              <a:rPr lang="en-US" dirty="0" smtClean="0"/>
+              <a:t>Naïve </a:t>
+            </a:r>
+            <a:r>
+              <a:rPr lang="en-US" dirty="0"/>
+              <a:t>–</a:t>
+            </a:r>
+            <a:r>
+              <a:rPr lang="en-US" dirty="0" smtClean="0"/>
+              <a:t> hope and pray, add resources</a:t>
+            </a:r>
+          </a:p>
+          <a:p>
+            <a:pPr lvl="2" indent="-457200" algn="l">
+              <a:buFont typeface="Arial"/>
+              <a:buChar char="•"/>
+            </a:pPr>
+            <a:r>
+              <a:rPr lang="en-US" dirty="0" smtClean="0"/>
+              <a:t>Fork – start a new process</a:t>
+            </a:r>
+          </a:p>
+          <a:p>
+            <a:pPr lvl="2" indent="-457200" algn="l">
+              <a:buFont typeface="Arial"/>
+              <a:buChar char="•"/>
+            </a:pPr>
+            <a:r>
+              <a:rPr lang="en-US" dirty="0" smtClean="0"/>
+              <a:t>Threads – parallelize within a process</a:t>
+            </a:r>
+          </a:p>
+          <a:p>
+            <a:pPr lvl="1" indent="-457200" algn="l">
+              <a:buFont typeface="Arial"/>
+              <a:buChar char="•"/>
+            </a:pPr>
+            <a:r>
+              <a:rPr lang="en-US" dirty="0" smtClean="0"/>
+              <a:t>Pros and Cons</a:t>
+            </a:r>
+          </a:p>
+          <a:p>
+            <a:pPr lvl="2" indent="-457200" algn="l">
+              <a:buFont typeface="Arial"/>
+              <a:buChar char="•"/>
+            </a:pPr>
+            <a:r>
+              <a:rPr lang="en-US" dirty="0" smtClean="0"/>
+              <a:t>Naïve – easy, but weak</a:t>
+            </a:r>
+          </a:p>
+          <a:p>
+            <a:pPr lvl="2" indent="-457200" algn="l">
+              <a:buFont typeface="Arial"/>
+              <a:buChar char="•"/>
+            </a:pPr>
+            <a:r>
+              <a:rPr lang="en-US" dirty="0" smtClean="0"/>
+              <a:t>Fork – simple, full featured, resource hog</a:t>
+            </a:r>
+          </a:p>
+          <a:p>
+            <a:pPr lvl="2" indent="-457200" algn="l">
+              <a:buFont typeface="Arial"/>
+              <a:buChar char="•"/>
+            </a:pPr>
+            <a:r>
+              <a:rPr lang="en-US" dirty="0" smtClean="0"/>
+              <a:t>Threads – super computational, super complicated</a:t>
+            </a:r>
+            <a:endParaRPr lang="en-US" dirty="0" smtClean="0"/>
+          </a:p>
+        </p:txBody>
+      </p:sp>
+    </p:spTree>
+    <p:extLst>
+      <p:ext uri="{BB962C8B-B14F-4D97-AF65-F5344CB8AC3E}">
+        <p14:creationId xmlns:p14="http://schemas.microsoft.com/office/powerpoint/2010/main" val="3884676083"/>
+      </p:ext>
+    </p:extLst>
+  </p:cSld>
+  <p:clrMapOvr>
+    <a:masterClrMapping/>
+  </p:clrMapOvr>
+</p:sld>
+</file>
+
+<file path=ppt/slides/slide47.xml><?xml version="1.0" encoding="utf-8"?>
+<p:sld xmlns:a="http://schemas.openxmlformats.org/drawingml/2006/main" xmlns:r="http://schemas.openxmlformats.org/officeDocument/2006/relationships" xmlns:p="http://schemas.openxmlformats.org/presentationml/2006/main">
+  <p:cSld>
+    <p:spTree>
+      <p:nvGrpSpPr>
+        <p:cNvPr id="1" name=""/>
+        <p:cNvGrpSpPr/>
+        <p:nvPr/>
+      </p:nvGrpSpPr>
+      <p:grpSpPr>
+        <a:xfrm>
+          <a:off x="0" y="0"/>
+          <a:ext cx="0" cy="0"/>
+          <a:chOff x="0" y="0"/>
+          <a:chExt cx="0" cy="0"/>
+        </a:xfrm>
+      </p:grpSpPr>
+      <p:sp>
+        <p:nvSpPr>
+          <p:cNvPr id="2" name="Title 1"/>
+          <p:cNvSpPr>
+            <a:spLocks noGrp="1"/>
+          </p:cNvSpPr>
+          <p:nvPr>
+            <p:ph type="ctrTitle"/>
+          </p:nvPr>
+        </p:nvSpPr>
+        <p:spPr>
+          <a:xfrm>
+            <a:off x="685800" y="160685"/>
+            <a:ext cx="7772400" cy="1470025"/>
+          </a:xfrm>
+        </p:spPr>
+        <p:txBody>
+          <a:bodyPr/>
+          <a:lstStyle/>
+          <a:p>
+            <a:r>
+              <a:rPr lang="en-US" dirty="0" err="1" smtClean="0"/>
+              <a:t>Node.js</a:t>
+            </a:r>
+            <a:r>
+              <a:rPr lang="en-US" dirty="0" smtClean="0"/>
+              <a:t> architecture</a:t>
+            </a:r>
+            <a:endParaRPr lang="en-US" dirty="0"/>
+          </a:p>
+        </p:txBody>
+      </p:sp>
+      <p:sp>
+        <p:nvSpPr>
+          <p:cNvPr id="3" name="Subtitle 2"/>
+          <p:cNvSpPr>
+            <a:spLocks noGrp="1"/>
+          </p:cNvSpPr>
+          <p:nvPr>
+            <p:ph type="subTitle" idx="1"/>
+          </p:nvPr>
+        </p:nvSpPr>
+        <p:spPr>
+          <a:xfrm>
+            <a:off x="1371600" y="1630710"/>
+            <a:ext cx="6400800" cy="4609893"/>
+          </a:xfrm>
+        </p:spPr>
+        <p:txBody>
+          <a:bodyPr>
+            <a:normAutofit/>
+          </a:bodyPr>
+          <a:lstStyle/>
+          <a:p>
+            <a:pPr marL="0" lvl="1" algn="l"/>
+            <a:r>
+              <a:rPr lang="en-US" dirty="0" smtClean="0"/>
+              <a:t>Why </a:t>
+            </a:r>
+            <a:r>
+              <a:rPr lang="en-US" dirty="0" err="1" smtClean="0"/>
+              <a:t>Node.js</a:t>
+            </a:r>
+            <a:r>
+              <a:rPr lang="en-US" dirty="0" smtClean="0"/>
+              <a:t>?</a:t>
+            </a:r>
+          </a:p>
+          <a:p>
+            <a:pPr lvl="1" indent="-457200" algn="l">
+              <a:buFont typeface="Arial"/>
+              <a:buChar char="•"/>
+            </a:pPr>
+            <a:r>
+              <a:rPr lang="en-US" dirty="0" smtClean="0"/>
+              <a:t>The Middle Path</a:t>
+            </a:r>
+          </a:p>
+          <a:p>
+            <a:pPr lvl="1" indent="-457200" algn="l">
+              <a:buFont typeface="Arial"/>
+              <a:buChar char="•"/>
+            </a:pPr>
+            <a:r>
+              <a:rPr lang="en-US" dirty="0" smtClean="0"/>
+              <a:t>Single threaded</a:t>
+            </a:r>
+          </a:p>
+          <a:p>
+            <a:pPr lvl="1" indent="-457200" algn="l">
+              <a:buFont typeface="Arial"/>
+              <a:buChar char="•"/>
+            </a:pPr>
+            <a:r>
+              <a:rPr lang="en-US" dirty="0" smtClean="0"/>
+              <a:t>Relies on event paradigm</a:t>
+            </a:r>
+            <a:endParaRPr lang="en-US" dirty="0" smtClean="0"/>
+          </a:p>
+        </p:txBody>
+      </p:sp>
+    </p:spTree>
+    <p:extLst>
+      <p:ext uri="{BB962C8B-B14F-4D97-AF65-F5344CB8AC3E}">
+        <p14:creationId xmlns:p14="http://schemas.microsoft.com/office/powerpoint/2010/main" val="2197963047"/>
+      </p:ext>
+    </p:extLst>
+  </p:cSld>
+  <p:clrMapOvr>
+    <a:masterClrMapping/>
+  </p:clrMapOvr>
+</p:sld>
+</file>
+
+<file path=ppt/slides/slide48.xml><?xml version="1.0" encoding="utf-8"?>
+<p:sld xmlns:a="http://schemas.openxmlformats.org/drawingml/2006/main" xmlns:r="http://schemas.openxmlformats.org/officeDocument/2006/relationships" xmlns:p="http://schemas.openxmlformats.org/presentationml/2006/main">
+  <p:cSld>
+    <p:spTree>
+      <p:nvGrpSpPr>
+        <p:cNvPr id="1" name=""/>
+        <p:cNvGrpSpPr/>
+        <p:nvPr/>
+      </p:nvGrpSpPr>
+      <p:grpSpPr>
+        <a:xfrm>
+          <a:off x="0" y="0"/>
+          <a:ext cx="0" cy="0"/>
+          <a:chOff x="0" y="0"/>
+          <a:chExt cx="0" cy="0"/>
+        </a:xfrm>
+      </p:grpSpPr>
+      <p:sp>
+        <p:nvSpPr>
+          <p:cNvPr id="2" name="Title 1"/>
+          <p:cNvSpPr>
+            <a:spLocks noGrp="1"/>
+          </p:cNvSpPr>
+          <p:nvPr>
+            <p:ph type="ctrTitle"/>
+          </p:nvPr>
+        </p:nvSpPr>
+        <p:spPr>
+          <a:xfrm>
+            <a:off x="685800" y="160685"/>
+            <a:ext cx="7772400" cy="1470025"/>
+          </a:xfrm>
+        </p:spPr>
+        <p:txBody>
+          <a:bodyPr/>
+          <a:lstStyle/>
+          <a:p>
+            <a:r>
+              <a:rPr lang="en-US" dirty="0" err="1" smtClean="0"/>
+              <a:t>Node.js</a:t>
+            </a:r>
+            <a:r>
+              <a:rPr lang="en-US" dirty="0" smtClean="0"/>
+              <a:t> architecture</a:t>
+            </a:r>
+            <a:endParaRPr lang="en-US" dirty="0"/>
+          </a:p>
+        </p:txBody>
+      </p:sp>
+      <p:sp>
+        <p:nvSpPr>
+          <p:cNvPr id="3" name="Subtitle 2"/>
+          <p:cNvSpPr>
+            <a:spLocks noGrp="1"/>
+          </p:cNvSpPr>
+          <p:nvPr>
+            <p:ph type="subTitle" idx="1"/>
+          </p:nvPr>
+        </p:nvSpPr>
+        <p:spPr>
+          <a:xfrm>
+            <a:off x="1371600" y="1630710"/>
+            <a:ext cx="6400800" cy="4609893"/>
+          </a:xfrm>
+        </p:spPr>
+        <p:txBody>
+          <a:bodyPr>
+            <a:normAutofit fontScale="92500"/>
+          </a:bodyPr>
+          <a:lstStyle/>
+          <a:p>
+            <a:pPr marL="0" lvl="1" algn="l"/>
+            <a:r>
+              <a:rPr lang="en-US" dirty="0" smtClean="0"/>
+              <a:t>Event driven model</a:t>
+            </a:r>
+          </a:p>
+          <a:p>
+            <a:pPr lvl="1" indent="-457200" algn="l">
+              <a:buFont typeface="Arial"/>
+              <a:buChar char="•"/>
+            </a:pPr>
+            <a:r>
+              <a:rPr lang="en-US" dirty="0" smtClean="0"/>
+              <a:t>Think of a radio station</a:t>
+            </a:r>
+          </a:p>
+          <a:p>
+            <a:pPr lvl="1" indent="-457200" algn="l">
+              <a:buFont typeface="Arial"/>
+              <a:buChar char="•"/>
+            </a:pPr>
+            <a:r>
+              <a:rPr lang="en-US" dirty="0" smtClean="0"/>
+              <a:t>Broadcasts songs, commercials, IDs</a:t>
+            </a:r>
+          </a:p>
+          <a:p>
+            <a:pPr lvl="1" indent="-457200" algn="l">
+              <a:buFont typeface="Arial"/>
+              <a:buChar char="•"/>
+            </a:pPr>
+            <a:r>
+              <a:rPr lang="en-US" dirty="0" smtClean="0"/>
+              <a:t>Doesn't know </a:t>
+            </a:r>
+          </a:p>
+          <a:p>
+            <a:pPr lvl="2" indent="-457200" algn="l">
+              <a:buFont typeface="Arial"/>
+              <a:buChar char="•"/>
+            </a:pPr>
+            <a:r>
+              <a:rPr lang="en-US" dirty="0" smtClean="0"/>
+              <a:t>who is listening</a:t>
+            </a:r>
+          </a:p>
+          <a:p>
+            <a:pPr lvl="2" indent="-457200" algn="l">
+              <a:buFont typeface="Arial"/>
+              <a:buChar char="•"/>
+            </a:pPr>
+            <a:r>
+              <a:rPr lang="en-US" dirty="0"/>
+              <a:t>when they </a:t>
+            </a:r>
+            <a:r>
+              <a:rPr lang="en-US" dirty="0" smtClean="0"/>
+              <a:t>tune in / out</a:t>
+            </a:r>
+          </a:p>
+          <a:p>
+            <a:pPr lvl="2" indent="-457200" algn="l">
+              <a:buFont typeface="Arial"/>
+              <a:buChar char="•"/>
+            </a:pPr>
+            <a:r>
+              <a:rPr lang="en-US" dirty="0" smtClean="0"/>
+              <a:t>what they do with the broadcast</a:t>
+            </a:r>
+          </a:p>
+          <a:p>
+            <a:pPr lvl="2" indent="-457200" algn="l">
+              <a:buFont typeface="Arial"/>
+              <a:buChar char="•"/>
+            </a:pPr>
+            <a:r>
+              <a:rPr lang="en-US" dirty="0" smtClean="0"/>
+              <a:t>music fan / advertiser / FCC agent</a:t>
+            </a:r>
+          </a:p>
+          <a:p>
+            <a:pPr lvl="1" indent="-457200" algn="l">
+              <a:buFont typeface="Arial"/>
+              <a:buChar char="•"/>
+            </a:pPr>
+            <a:r>
+              <a:rPr lang="en-US" dirty="0" smtClean="0"/>
+              <a:t>Fan hasn't heard favorite, calls in a request</a:t>
+            </a:r>
+          </a:p>
+          <a:p>
+            <a:pPr lvl="1" indent="-457200" algn="l">
+              <a:buFont typeface="Arial"/>
+              <a:buChar char="•"/>
+            </a:pPr>
+            <a:r>
+              <a:rPr lang="en-US" dirty="0" smtClean="0"/>
+              <a:t>DJ schedules request at end of playlist</a:t>
+            </a:r>
+          </a:p>
+        </p:txBody>
+      </p:sp>
+    </p:spTree>
+    <p:extLst>
+      <p:ext uri="{BB962C8B-B14F-4D97-AF65-F5344CB8AC3E}">
+        <p14:creationId xmlns:p14="http://schemas.microsoft.com/office/powerpoint/2010/main" val="2197963047"/>
+      </p:ext>
+    </p:extLst>
+  </p:cSld>
+  <p:clrMapOvr>
+    <a:masterClrMapping/>
+  </p:clrMapOvr>
+</p:sld>
+</file>
+
+<file path=ppt/slides/slide49.xml><?xml version="1.0" encoding="utf-8"?>
+<p:sld xmlns:a="http://schemas.openxmlformats.org/drawingml/2006/main" xmlns:r="http://schemas.openxmlformats.org/officeDocument/2006/relationships" xmlns:p="http://schemas.openxmlformats.org/presentationml/2006/main">
+  <p:cSld>
+    <p:spTree>
+      <p:nvGrpSpPr>
+        <p:cNvPr id="1" name=""/>
+        <p:cNvGrpSpPr/>
+        <p:nvPr/>
+      </p:nvGrpSpPr>
+      <p:grpSpPr>
+        <a:xfrm>
+          <a:off x="0" y="0"/>
+          <a:ext cx="0" cy="0"/>
+          <a:chOff x="0" y="0"/>
+          <a:chExt cx="0" cy="0"/>
+        </a:xfrm>
+      </p:grpSpPr>
+      <p:sp>
+        <p:nvSpPr>
+          <p:cNvPr id="2" name="Title 1"/>
+          <p:cNvSpPr>
+            <a:spLocks noGrp="1"/>
+          </p:cNvSpPr>
+          <p:nvPr>
+            <p:ph type="ctrTitle"/>
+          </p:nvPr>
+        </p:nvSpPr>
+        <p:spPr>
+          <a:xfrm>
+            <a:off x="685800" y="160685"/>
+            <a:ext cx="7772400" cy="1470025"/>
+          </a:xfrm>
+        </p:spPr>
+        <p:txBody>
+          <a:bodyPr/>
+          <a:lstStyle/>
+          <a:p>
+            <a:r>
+              <a:rPr lang="en-US" dirty="0" err="1" smtClean="0"/>
+              <a:t>Node.js</a:t>
+            </a:r>
+            <a:r>
+              <a:rPr lang="en-US" dirty="0" smtClean="0"/>
+              <a:t> architecture</a:t>
+            </a:r>
+            <a:endParaRPr lang="en-US" dirty="0"/>
+          </a:p>
+        </p:txBody>
+      </p:sp>
+      <p:sp>
+        <p:nvSpPr>
+          <p:cNvPr id="3" name="Subtitle 2"/>
+          <p:cNvSpPr>
+            <a:spLocks noGrp="1"/>
+          </p:cNvSpPr>
+          <p:nvPr>
+            <p:ph type="subTitle" idx="1"/>
+          </p:nvPr>
+        </p:nvSpPr>
+        <p:spPr>
+          <a:xfrm>
+            <a:off x="685800" y="1630710"/>
+            <a:ext cx="4602149" cy="4609893"/>
+          </a:xfrm>
+        </p:spPr>
+        <p:txBody>
+          <a:bodyPr>
+            <a:normAutofit/>
+          </a:bodyPr>
+          <a:lstStyle/>
+          <a:p>
+            <a:pPr lvl="1" indent="-457200" algn="l">
+              <a:buFont typeface="Arial"/>
+              <a:buChar char="•"/>
+            </a:pPr>
+            <a:r>
+              <a:rPr lang="en-US" dirty="0" smtClean="0"/>
+              <a:t>Heap holds data</a:t>
+            </a:r>
+          </a:p>
+          <a:p>
+            <a:pPr lvl="2" indent="-457200" algn="l">
+              <a:buFont typeface="Arial"/>
+              <a:buChar char="•"/>
+            </a:pPr>
+            <a:r>
+              <a:rPr lang="en-US" dirty="0" smtClean="0"/>
+              <a:t>Function definitions</a:t>
+            </a:r>
+          </a:p>
+          <a:p>
+            <a:pPr lvl="2" indent="-457200" algn="l">
+              <a:buFont typeface="Arial"/>
+              <a:buChar char="•"/>
+            </a:pPr>
+            <a:r>
+              <a:rPr lang="en-US" dirty="0" smtClean="0"/>
+              <a:t>Variables</a:t>
+            </a:r>
+          </a:p>
+          <a:p>
+            <a:pPr lvl="1" indent="-457200" algn="l">
+              <a:buFont typeface="Arial"/>
+              <a:buChar char="•"/>
+            </a:pPr>
+            <a:r>
+              <a:rPr lang="en-US" dirty="0" smtClean="0"/>
+              <a:t>Queue pushes onto stac</a:t>
+            </a:r>
+            <a:r>
+              <a:rPr lang="en-US" dirty="0"/>
+              <a:t>k</a:t>
+            </a:r>
+            <a:endParaRPr lang="en-US" dirty="0" smtClean="0"/>
+          </a:p>
+          <a:p>
+            <a:pPr lvl="1" indent="-457200" algn="l">
+              <a:buFont typeface="Arial"/>
+              <a:buChar char="•"/>
+            </a:pPr>
+            <a:r>
+              <a:rPr lang="en-US" dirty="0" smtClean="0"/>
+              <a:t>Stack executes</a:t>
+            </a:r>
+          </a:p>
+          <a:p>
+            <a:pPr lvl="2" indent="-457200" algn="l">
+              <a:buFont typeface="Arial"/>
+              <a:buChar char="•"/>
+            </a:pPr>
+            <a:r>
+              <a:rPr lang="en-US" dirty="0" smtClean="0"/>
+              <a:t>Provides pointers to data</a:t>
+            </a:r>
+          </a:p>
+          <a:p>
+            <a:pPr lvl="2" indent="-457200" algn="l">
+              <a:buFont typeface="Arial"/>
+              <a:buChar char="•"/>
+            </a:pPr>
+            <a:r>
+              <a:rPr lang="en-US" dirty="0" smtClean="0"/>
+              <a:t>Runs to completion</a:t>
+            </a:r>
+          </a:p>
+          <a:p>
+            <a:pPr lvl="1" indent="-457200" algn="l">
+              <a:buFont typeface="Arial"/>
+              <a:buChar char="•"/>
+            </a:pPr>
+            <a:r>
+              <a:rPr lang="en-US" dirty="0" smtClean="0"/>
+              <a:t>I/O and other events add to Queue</a:t>
+            </a:r>
+          </a:p>
+        </p:txBody>
+      </p:sp>
+      <p:pic>
+        <p:nvPicPr>
+          <p:cNvPr id="4" name="Picture 3"/>
+          <p:cNvPicPr>
+            <a:picLocks noChangeAspect="1"/>
+          </p:cNvPicPr>
+          <p:nvPr/>
+        </p:nvPicPr>
+        <p:blipFill>
+          <a:blip r:embed="rId2"/>
+          <a:stretch>
+            <a:fillRect/>
+          </a:stretch>
+        </p:blipFill>
+        <p:spPr>
+          <a:xfrm>
+            <a:off x="5037655" y="1714500"/>
+            <a:ext cx="3733800" cy="3429000"/>
+          </a:xfrm>
+          <a:prstGeom prst="rect">
+            <a:avLst/>
+          </a:prstGeom>
+        </p:spPr>
+      </p:pic>
+      <p:sp>
+        <p:nvSpPr>
+          <p:cNvPr id="5" name="TextBox 4"/>
+          <p:cNvSpPr txBox="1"/>
+          <p:nvPr/>
+        </p:nvSpPr>
+        <p:spPr>
+          <a:xfrm>
+            <a:off x="6167239" y="5383548"/>
+            <a:ext cx="1428997" cy="369332"/>
+          </a:xfrm>
+          <a:prstGeom prst="rect">
+            <a:avLst/>
+          </a:prstGeom>
+          <a:noFill/>
+        </p:spPr>
+        <p:txBody>
+          <a:bodyPr wrap="none" rtlCol="0">
+            <a:spAutoFit/>
+          </a:bodyPr>
+          <a:lstStyle/>
+          <a:p>
+            <a:r>
+              <a:rPr lang="en-US" dirty="0" smtClean="0"/>
+              <a:t>Source: MDN</a:t>
+            </a:r>
+            <a:endParaRPr lang="en-US" dirty="0"/>
+          </a:p>
+        </p:txBody>
+      </p:sp>
+    </p:spTree>
+    <p:extLst>
+      <p:ext uri="{BB962C8B-B14F-4D97-AF65-F5344CB8AC3E}">
+        <p14:creationId xmlns:p14="http://schemas.microsoft.com/office/powerpoint/2010/main" val="619168785"/>
+      </p:ext>
+    </p:extLst>
+  </p:cSld>
+  <p:clrMapOvr>
+    <a:masterClrMapping/>
+  </p:clrMapOvr>
+</p:sld>
+</file>
+
 <file path=ppt/slides/slide5.xml><?xml version="1.0" encoding="utf-8"?>
 <p:sld xmlns:a="http://schemas.openxmlformats.org/drawingml/2006/main" xmlns:r="http://schemas.openxmlformats.org/officeDocument/2006/relationships" xmlns:p="http://schemas.openxmlformats.org/presentationml/2006/main">
   <p:cSld>
@@ -9359,7 +11633,6 @@
               <a:rPr lang="en-US" dirty="0"/>
               <a:t>Unit Testing</a:t>
             </a:r>
-            <a:endParaRPr lang="en-US" dirty="0"/>
           </a:p>
         </p:txBody>
       </p:sp>
@@ -9367,6 +11640,496 @@
     <p:extLst>
       <p:ext uri="{BB962C8B-B14F-4D97-AF65-F5344CB8AC3E}">
         <p14:creationId xmlns:p14="http://schemas.microsoft.com/office/powerpoint/2010/main" val="3309695354"/>
+      </p:ext>
+    </p:extLst>
+  </p:cSld>
+  <p:clrMapOvr>
+    <a:masterClrMapping/>
+  </p:clrMapOvr>
+</p:sld>
+</file>
+
+<file path=ppt/slides/slide50.xml><?xml version="1.0" encoding="utf-8"?>
+<p:sld xmlns:a="http://schemas.openxmlformats.org/drawingml/2006/main" xmlns:r="http://schemas.openxmlformats.org/officeDocument/2006/relationships" xmlns:p="http://schemas.openxmlformats.org/presentationml/2006/main">
+  <p:cSld>
+    <p:spTree>
+      <p:nvGrpSpPr>
+        <p:cNvPr id="1" name=""/>
+        <p:cNvGrpSpPr/>
+        <p:nvPr/>
+      </p:nvGrpSpPr>
+      <p:grpSpPr>
+        <a:xfrm>
+          <a:off x="0" y="0"/>
+          <a:ext cx="0" cy="0"/>
+          <a:chOff x="0" y="0"/>
+          <a:chExt cx="0" cy="0"/>
+        </a:xfrm>
+      </p:grpSpPr>
+      <p:sp>
+        <p:nvSpPr>
+          <p:cNvPr id="2" name="Title 1"/>
+          <p:cNvSpPr>
+            <a:spLocks noGrp="1"/>
+          </p:cNvSpPr>
+          <p:nvPr>
+            <p:ph type="ctrTitle"/>
+          </p:nvPr>
+        </p:nvSpPr>
+        <p:spPr>
+          <a:xfrm>
+            <a:off x="685800" y="160685"/>
+            <a:ext cx="7772400" cy="1470025"/>
+          </a:xfrm>
+        </p:spPr>
+        <p:txBody>
+          <a:bodyPr/>
+          <a:lstStyle/>
+          <a:p>
+            <a:r>
+              <a:rPr lang="en-US" dirty="0" err="1" smtClean="0"/>
+              <a:t>Node.js</a:t>
+            </a:r>
+            <a:r>
+              <a:rPr lang="en-US" dirty="0" smtClean="0"/>
+              <a:t> architecture</a:t>
+            </a:r>
+            <a:endParaRPr lang="en-US" dirty="0"/>
+          </a:p>
+        </p:txBody>
+      </p:sp>
+      <p:sp>
+        <p:nvSpPr>
+          <p:cNvPr id="3" name="Subtitle 2"/>
+          <p:cNvSpPr>
+            <a:spLocks noGrp="1"/>
+          </p:cNvSpPr>
+          <p:nvPr>
+            <p:ph type="subTitle" idx="1"/>
+          </p:nvPr>
+        </p:nvSpPr>
+        <p:spPr>
+          <a:xfrm>
+            <a:off x="1371600" y="1630710"/>
+            <a:ext cx="6400800" cy="4609893"/>
+          </a:xfrm>
+        </p:spPr>
+        <p:txBody>
+          <a:bodyPr>
+            <a:normAutofit/>
+          </a:bodyPr>
+          <a:lstStyle/>
+          <a:p>
+            <a:pPr lvl="1" indent="-457200" algn="l">
+              <a:buFont typeface="Arial"/>
+              <a:buChar char="•"/>
+            </a:pPr>
+            <a:r>
+              <a:rPr lang="en-US" dirty="0" smtClean="0"/>
+              <a:t>Pros </a:t>
+            </a:r>
+          </a:p>
+          <a:p>
+            <a:pPr lvl="2" indent="-457200" algn="l">
+              <a:buFont typeface="Arial"/>
+              <a:buChar char="•"/>
+            </a:pPr>
+            <a:r>
+              <a:rPr lang="en-US" dirty="0" smtClean="0"/>
+              <a:t>Each stack executes deterministically</a:t>
+            </a:r>
+          </a:p>
+          <a:p>
+            <a:pPr lvl="2" indent="-457200" algn="l">
+              <a:buFont typeface="Arial"/>
+              <a:buChar char="•"/>
+            </a:pPr>
+            <a:r>
+              <a:rPr lang="en-US" dirty="0" smtClean="0"/>
+              <a:t>Loop can queue latent tasks and move on</a:t>
+            </a:r>
+          </a:p>
+          <a:p>
+            <a:pPr lvl="2" indent="-457200" algn="l">
+              <a:buFont typeface="Arial"/>
+              <a:buChar char="•"/>
+            </a:pPr>
+            <a:r>
+              <a:rPr lang="en-US" dirty="0" smtClean="0"/>
+              <a:t>Flexibility of threading without nightmares</a:t>
+            </a:r>
+          </a:p>
+          <a:p>
+            <a:pPr lvl="1" indent="-457200" algn="l">
+              <a:buFont typeface="Arial"/>
+              <a:buChar char="•"/>
+            </a:pPr>
+            <a:r>
+              <a:rPr lang="en-US" dirty="0" smtClean="0"/>
+              <a:t>Cons</a:t>
+            </a:r>
+          </a:p>
+          <a:p>
+            <a:pPr lvl="2" indent="-457200" algn="l">
+              <a:buFont typeface="Arial"/>
+              <a:buChar char="•"/>
+            </a:pPr>
+            <a:r>
+              <a:rPr lang="en-US" dirty="0" smtClean="0"/>
+              <a:t>Multi-threading works great for CPU tasks</a:t>
+            </a:r>
+          </a:p>
+          <a:p>
+            <a:pPr lvl="2" indent="-457200" algn="l">
+              <a:buFont typeface="Arial"/>
+              <a:buChar char="•"/>
+            </a:pPr>
+            <a:r>
+              <a:rPr lang="en-US" dirty="0" smtClean="0"/>
+              <a:t>Stack can potentially get bogged down</a:t>
+            </a:r>
+          </a:p>
+          <a:p>
+            <a:pPr lvl="2" indent="-457200" algn="l">
+              <a:buFont typeface="Arial"/>
+              <a:buChar char="•"/>
+            </a:pPr>
+            <a:r>
+              <a:rPr lang="en-US" dirty="0" smtClean="0"/>
+              <a:t>Thinking in </a:t>
+            </a:r>
+            <a:r>
+              <a:rPr lang="en-US" dirty="0" err="1" smtClean="0"/>
+              <a:t>async</a:t>
+            </a:r>
+            <a:r>
+              <a:rPr lang="en-US" dirty="0" smtClean="0"/>
+              <a:t> paradigm still required</a:t>
+            </a:r>
+          </a:p>
+        </p:txBody>
+      </p:sp>
+    </p:spTree>
+    <p:extLst>
+      <p:ext uri="{BB962C8B-B14F-4D97-AF65-F5344CB8AC3E}">
+        <p14:creationId xmlns:p14="http://schemas.microsoft.com/office/powerpoint/2010/main" val="45506257"/>
+      </p:ext>
+    </p:extLst>
+  </p:cSld>
+  <p:clrMapOvr>
+    <a:masterClrMapping/>
+  </p:clrMapOvr>
+</p:sld>
+</file>
+
+<file path=ppt/slides/slide51.xml><?xml version="1.0" encoding="utf-8"?>
+<p:sld xmlns:a="http://schemas.openxmlformats.org/drawingml/2006/main" xmlns:r="http://schemas.openxmlformats.org/officeDocument/2006/relationships" xmlns:p="http://schemas.openxmlformats.org/presentationml/2006/main">
+  <p:cSld>
+    <p:spTree>
+      <p:nvGrpSpPr>
+        <p:cNvPr id="1" name=""/>
+        <p:cNvGrpSpPr/>
+        <p:nvPr/>
+      </p:nvGrpSpPr>
+      <p:grpSpPr>
+        <a:xfrm>
+          <a:off x="0" y="0"/>
+          <a:ext cx="0" cy="0"/>
+          <a:chOff x="0" y="0"/>
+          <a:chExt cx="0" cy="0"/>
+        </a:xfrm>
+      </p:grpSpPr>
+      <p:sp>
+        <p:nvSpPr>
+          <p:cNvPr id="2" name="Title 1"/>
+          <p:cNvSpPr>
+            <a:spLocks noGrp="1"/>
+          </p:cNvSpPr>
+          <p:nvPr>
+            <p:ph type="ctrTitle"/>
+          </p:nvPr>
+        </p:nvSpPr>
+        <p:spPr>
+          <a:xfrm>
+            <a:off x="685800" y="160685"/>
+            <a:ext cx="7772400" cy="1470025"/>
+          </a:xfrm>
+        </p:spPr>
+        <p:txBody>
+          <a:bodyPr/>
+          <a:lstStyle/>
+          <a:p>
+            <a:r>
+              <a:rPr lang="en-US" dirty="0" err="1" smtClean="0"/>
+              <a:t>Node.js</a:t>
+            </a:r>
+            <a:r>
+              <a:rPr lang="en-US" dirty="0" smtClean="0"/>
+              <a:t> architecture</a:t>
+            </a:r>
+            <a:endParaRPr lang="en-US" dirty="0"/>
+          </a:p>
+        </p:txBody>
+      </p:sp>
+      <p:pic>
+        <p:nvPicPr>
+          <p:cNvPr id="4" name="Picture 3" descr="Screen Shot 2016-11-08 at 3.32.24 PM.png"/>
+          <p:cNvPicPr>
+            <a:picLocks noChangeAspect="1"/>
+          </p:cNvPicPr>
+          <p:nvPr/>
+        </p:nvPicPr>
+        <p:blipFill>
+          <a:blip r:embed="rId2">
+            <a:extLst>
+              <a:ext uri="{28A0092B-C50C-407E-A947-70E740481C1C}">
+                <a14:useLocalDpi xmlns:a14="http://schemas.microsoft.com/office/drawing/2010/main" val="0"/>
+              </a:ext>
+            </a:extLst>
+          </a:blip>
+          <a:stretch>
+            <a:fillRect/>
+          </a:stretch>
+        </p:blipFill>
+        <p:spPr>
+          <a:xfrm>
+            <a:off x="3069075" y="1630710"/>
+            <a:ext cx="5130800" cy="4622800"/>
+          </a:xfrm>
+          <a:prstGeom prst="rect">
+            <a:avLst/>
+          </a:prstGeom>
+        </p:spPr>
+      </p:pic>
+      <p:sp>
+        <p:nvSpPr>
+          <p:cNvPr id="5" name="TextBox 4"/>
+          <p:cNvSpPr txBox="1"/>
+          <p:nvPr/>
+        </p:nvSpPr>
+        <p:spPr>
+          <a:xfrm>
+            <a:off x="464069" y="1782805"/>
+            <a:ext cx="2262158" cy="861774"/>
+          </a:xfrm>
+          <a:prstGeom prst="rect">
+            <a:avLst/>
+          </a:prstGeom>
+          <a:noFill/>
+        </p:spPr>
+        <p:txBody>
+          <a:bodyPr wrap="none" rtlCol="0">
+            <a:spAutoFit/>
+          </a:bodyPr>
+          <a:lstStyle/>
+          <a:p>
+            <a:r>
+              <a:rPr lang="en-US" sz="3200" dirty="0" smtClean="0"/>
+              <a:t>Event Loop</a:t>
+            </a:r>
+          </a:p>
+          <a:p>
+            <a:r>
+              <a:rPr lang="en-US" dirty="0" smtClean="0"/>
+              <a:t>Source: </a:t>
+            </a:r>
+            <a:r>
+              <a:rPr lang="en-US" dirty="0" err="1" smtClean="0"/>
+              <a:t>github</a:t>
+            </a:r>
+            <a:r>
+              <a:rPr lang="en-US" dirty="0" smtClean="0"/>
+              <a:t>/</a:t>
+            </a:r>
+            <a:r>
+              <a:rPr lang="en-US" dirty="0" err="1" smtClean="0"/>
+              <a:t>nodejs</a:t>
+            </a:r>
+            <a:endParaRPr lang="en-US" dirty="0"/>
+          </a:p>
+        </p:txBody>
+      </p:sp>
+    </p:spTree>
+    <p:extLst>
+      <p:ext uri="{BB962C8B-B14F-4D97-AF65-F5344CB8AC3E}">
+        <p14:creationId xmlns:p14="http://schemas.microsoft.com/office/powerpoint/2010/main" val="3255137183"/>
+      </p:ext>
+    </p:extLst>
+  </p:cSld>
+  <p:clrMapOvr>
+    <a:masterClrMapping/>
+  </p:clrMapOvr>
+</p:sld>
+</file>
+
+<file path=ppt/slides/slide52.xml><?xml version="1.0" encoding="utf-8"?>
+<p:sld xmlns:a="http://schemas.openxmlformats.org/drawingml/2006/main" xmlns:r="http://schemas.openxmlformats.org/officeDocument/2006/relationships" xmlns:p="http://schemas.openxmlformats.org/presentationml/2006/main">
+  <p:cSld>
+    <p:spTree>
+      <p:nvGrpSpPr>
+        <p:cNvPr id="1" name=""/>
+        <p:cNvGrpSpPr/>
+        <p:nvPr/>
+      </p:nvGrpSpPr>
+      <p:grpSpPr>
+        <a:xfrm>
+          <a:off x="0" y="0"/>
+          <a:ext cx="0" cy="0"/>
+          <a:chOff x="0" y="0"/>
+          <a:chExt cx="0" cy="0"/>
+        </a:xfrm>
+      </p:grpSpPr>
+      <p:sp>
+        <p:nvSpPr>
+          <p:cNvPr id="2" name="Title 1"/>
+          <p:cNvSpPr>
+            <a:spLocks noGrp="1"/>
+          </p:cNvSpPr>
+          <p:nvPr>
+            <p:ph type="ctrTitle"/>
+          </p:nvPr>
+        </p:nvSpPr>
+        <p:spPr>
+          <a:xfrm>
+            <a:off x="685800" y="160685"/>
+            <a:ext cx="7772400" cy="1470025"/>
+          </a:xfrm>
+        </p:spPr>
+        <p:txBody>
+          <a:bodyPr/>
+          <a:lstStyle/>
+          <a:p>
+            <a:r>
+              <a:rPr lang="en-US" dirty="0" err="1" smtClean="0"/>
+              <a:t>Node.js</a:t>
+            </a:r>
+            <a:r>
+              <a:rPr lang="en-US" dirty="0" smtClean="0"/>
+              <a:t> architecture</a:t>
+            </a:r>
+            <a:endParaRPr lang="en-US" dirty="0"/>
+          </a:p>
+        </p:txBody>
+      </p:sp>
+      <p:sp>
+        <p:nvSpPr>
+          <p:cNvPr id="3" name="Subtitle 2"/>
+          <p:cNvSpPr>
+            <a:spLocks noGrp="1"/>
+          </p:cNvSpPr>
+          <p:nvPr>
+            <p:ph type="subTitle" idx="1"/>
+          </p:nvPr>
+        </p:nvSpPr>
+        <p:spPr>
+          <a:xfrm>
+            <a:off x="1371600" y="1630710"/>
+            <a:ext cx="6400800" cy="4609893"/>
+          </a:xfrm>
+        </p:spPr>
+        <p:txBody>
+          <a:bodyPr>
+            <a:normAutofit/>
+          </a:bodyPr>
+          <a:lstStyle/>
+          <a:p>
+            <a:pPr marL="0" lvl="1" algn="l"/>
+            <a:r>
+              <a:rPr lang="en-US" dirty="0" smtClean="0"/>
+              <a:t>Hardcore details</a:t>
+            </a:r>
+          </a:p>
+          <a:p>
+            <a:pPr lvl="1" indent="-457200" algn="l">
+              <a:buFont typeface="Arial"/>
+              <a:buChar char="•"/>
+            </a:pPr>
+            <a:r>
+              <a:rPr lang="en-US" dirty="0" smtClean="0"/>
+              <a:t>V8 compiles JS to machine language</a:t>
+            </a:r>
+          </a:p>
+          <a:p>
+            <a:pPr lvl="1" indent="-457200" algn="l">
+              <a:buFont typeface="Arial"/>
+              <a:buChar char="•"/>
+            </a:pPr>
+            <a:r>
+              <a:rPr lang="en-US" dirty="0" smtClean="0"/>
+              <a:t>User JS runs within </a:t>
+            </a:r>
+            <a:r>
+              <a:rPr lang="en-US" dirty="0" err="1" smtClean="0"/>
+              <a:t>libuv</a:t>
+            </a:r>
+            <a:r>
+              <a:rPr lang="en-US" dirty="0" smtClean="0"/>
+              <a:t> stack machine</a:t>
+            </a:r>
+          </a:p>
+          <a:p>
+            <a:pPr lvl="2" indent="-457200" algn="l">
+              <a:buFont typeface="Arial"/>
+              <a:buChar char="•"/>
+            </a:pPr>
+            <a:r>
+              <a:rPr lang="en-US" dirty="0" err="1" smtClean="0"/>
+              <a:t>libev</a:t>
+            </a:r>
+            <a:r>
+              <a:rPr lang="en-US" dirty="0" smtClean="0"/>
+              <a:t> – event library</a:t>
+            </a:r>
+          </a:p>
+          <a:p>
+            <a:pPr lvl="2" indent="-457200" algn="l">
+              <a:buFont typeface="Arial"/>
+              <a:buChar char="•"/>
+            </a:pPr>
+            <a:r>
+              <a:rPr lang="en-US" dirty="0" err="1" smtClean="0"/>
+              <a:t>libeio</a:t>
+            </a:r>
+            <a:r>
+              <a:rPr lang="en-US" dirty="0" smtClean="0"/>
+              <a:t> – </a:t>
+            </a:r>
+            <a:r>
+              <a:rPr lang="en-US" dirty="0" err="1" smtClean="0"/>
+              <a:t>async</a:t>
+            </a:r>
+            <a:r>
+              <a:rPr lang="en-US" dirty="0" smtClean="0"/>
+              <a:t> POSIX I/O</a:t>
+            </a:r>
+          </a:p>
+          <a:p>
+            <a:pPr lvl="1" indent="-457200" algn="l">
+              <a:buFont typeface="Arial"/>
+              <a:buChar char="•"/>
+            </a:pPr>
+            <a:r>
+              <a:rPr lang="en-US" dirty="0" smtClean="0"/>
+              <a:t>TLDR: Node JS can call C++ or Java code</a:t>
+            </a:r>
+          </a:p>
+          <a:p>
+            <a:pPr lvl="1" indent="-457200" algn="l">
+              <a:buFont typeface="Arial"/>
+              <a:buChar char="•"/>
+            </a:pPr>
+            <a:r>
+              <a:rPr lang="en-US" dirty="0" smtClean="0"/>
+              <a:t>Beyond the scope of this course</a:t>
+            </a:r>
+            <a:endParaRPr lang="en-US" dirty="0" smtClean="0"/>
+          </a:p>
+        </p:txBody>
+      </p:sp>
+    </p:spTree>
+    <p:extLst>
+      <p:ext uri="{BB962C8B-B14F-4D97-AF65-F5344CB8AC3E}">
+        <p14:creationId xmlns:p14="http://schemas.microsoft.com/office/powerpoint/2010/main" val="2630694218"/>
       </p:ext>
     </p:extLst>
   </p:cSld>
@@ -9581,7 +12344,6 @@
               <a:rPr lang="en-US" dirty="0"/>
               <a:t>Node in a Nutshell</a:t>
             </a:r>
-            <a:endParaRPr lang="en-US" dirty="0"/>
           </a:p>
         </p:txBody>
       </p:sp>
@@ -9650,30 +12412,12 @@
               <a:buChar char="•"/>
             </a:pPr>
             <a:r>
-              <a:rPr lang="en-US" dirty="0"/>
-              <a:t>Run </a:t>
-            </a:r>
-            <a:r>
-              <a:rPr lang="en-US" dirty="0" smtClean="0"/>
-              <a:t>anywhere </a:t>
-            </a:r>
-            <a:r>
-              <a:rPr lang="en-US" dirty="0"/>
-              <a:t>V8 is </a:t>
-            </a:r>
-            <a:r>
-              <a:rPr lang="en-US" dirty="0" smtClean="0"/>
-              <a:t>supported</a:t>
-            </a:r>
-          </a:p>
-          <a:p>
-            <a:pPr marL="457200" indent="-457200" algn="l">
-              <a:buFont typeface="Arial"/>
-              <a:buChar char="•"/>
-            </a:pPr>
-            <a:r>
-              <a:rPr lang="en-US" dirty="0" smtClean="0"/>
-              <a:t>Just-in-time (JIT) compiler</a:t>
+              <a:rPr lang="en-US" dirty="0" smtClean="0"/>
+              <a:t>Just</a:t>
+            </a:r>
+            <a:r>
+              <a:rPr lang="en-US" dirty="0" smtClean="0"/>
+              <a:t>-in-time (JIT) compiler</a:t>
             </a:r>
           </a:p>
           <a:p>
@@ -9744,7 +12488,6 @@
               <a:rPr lang="en-US" dirty="0"/>
               <a:t>Node in a Nutshell</a:t>
             </a:r>
-            <a:endParaRPr lang="en-US" dirty="0"/>
           </a:p>
         </p:txBody>
       </p:sp>
@@ -9803,9 +12546,20 @@
               <a:buChar char="•"/>
             </a:pPr>
             <a:r>
-              <a:rPr lang="en-US" dirty="0"/>
+              <a:rPr lang="en-US" dirty="0" smtClean="0"/>
               <a:t>Crypto</a:t>
             </a:r>
+          </a:p>
+          <a:p>
+            <a:pPr marL="457200" indent="-457200" algn="l">
+              <a:buFont typeface="Arial"/>
+              <a:buChar char="•"/>
+            </a:pPr>
+            <a:r>
+              <a:rPr lang="en-US" dirty="0" smtClean="0"/>
+              <a:t>more</a:t>
+            </a:r>
+            <a:endParaRPr lang="en-US" dirty="0"/>
           </a:p>
         </p:txBody>
       </p:sp>
@@ -9864,7 +12618,6 @@
               <a:rPr lang="en-US" dirty="0"/>
               <a:t>Node in a Nutshell</a:t>
             </a:r>
-            <a:endParaRPr lang="en-US" dirty="0"/>
           </a:p>
         </p:txBody>
       </p:sp>

</xml_diff>

<commit_message>
Slides: tweaks to day 1
</commit_message>
<xml_diff>
--- a/slides/Node Slides Day 1.pptx
+++ b/slides/Node Slides Day 1.pptx
@@ -16,8 +16,8 @@
     <p:sldId id="345" r:id="rId10"/>
     <p:sldId id="349" r:id="rId11"/>
     <p:sldId id="350" r:id="rId12"/>
-    <p:sldId id="348" r:id="rId13"/>
-    <p:sldId id="344" r:id="rId14"/>
+    <p:sldId id="344" r:id="rId13"/>
+    <p:sldId id="348" r:id="rId14"/>
     <p:sldId id="351" r:id="rId15"/>
     <p:sldId id="352" r:id="rId16"/>
     <p:sldId id="343" r:id="rId17"/>
@@ -66,6 +66,7 @@
     <p:sldId id="341" r:id="rId60"/>
     <p:sldId id="342" r:id="rId61"/>
     <p:sldId id="334" r:id="rId62"/>
+    <p:sldId id="353" r:id="rId63"/>
   </p:sldIdLst>
   <p:sldSz cx="9144000" cy="6858000" type="screen4x3"/>
   <p:notesSz cx="6858000" cy="9144000"/>
@@ -348,7 +349,7 @@
           <a:p>
             <a:fld id="{6BFECD78-3C8E-49F2-8FAB-59489D168ABB}" type="datetimeFigureOut">
               <a:rPr lang="en-US" smtClean="0"/>
-              <a:t>11/9/16</a:t>
+              <a:t>11/15/16</a:t>
             </a:fld>
             <a:endParaRPr lang="en-US"/>
           </a:p>
@@ -518,7 +519,7 @@
           <a:p>
             <a:fld id="{6BFECD78-3C8E-49F2-8FAB-59489D168ABB}" type="datetimeFigureOut">
               <a:rPr lang="en-US" smtClean="0"/>
-              <a:t>11/9/16</a:t>
+              <a:t>11/15/16</a:t>
             </a:fld>
             <a:endParaRPr lang="en-US"/>
           </a:p>
@@ -698,7 +699,7 @@
           <a:p>
             <a:fld id="{6BFECD78-3C8E-49F2-8FAB-59489D168ABB}" type="datetimeFigureOut">
               <a:rPr lang="en-US" smtClean="0"/>
-              <a:t>11/9/16</a:t>
+              <a:t>11/15/16</a:t>
             </a:fld>
             <a:endParaRPr lang="en-US"/>
           </a:p>
@@ -868,7 +869,7 @@
           <a:p>
             <a:fld id="{6BFECD78-3C8E-49F2-8FAB-59489D168ABB}" type="datetimeFigureOut">
               <a:rPr lang="en-US" smtClean="0"/>
-              <a:t>11/9/16</a:t>
+              <a:t>11/15/16</a:t>
             </a:fld>
             <a:endParaRPr lang="en-US"/>
           </a:p>
@@ -1114,7 +1115,7 @@
           <a:p>
             <a:fld id="{6BFECD78-3C8E-49F2-8FAB-59489D168ABB}" type="datetimeFigureOut">
               <a:rPr lang="en-US" smtClean="0"/>
-              <a:t>11/9/16</a:t>
+              <a:t>11/15/16</a:t>
             </a:fld>
             <a:endParaRPr lang="en-US"/>
           </a:p>
@@ -1402,7 +1403,7 @@
           <a:p>
             <a:fld id="{6BFECD78-3C8E-49F2-8FAB-59489D168ABB}" type="datetimeFigureOut">
               <a:rPr lang="en-US" smtClean="0"/>
-              <a:t>11/9/16</a:t>
+              <a:t>11/15/16</a:t>
             </a:fld>
             <a:endParaRPr lang="en-US"/>
           </a:p>
@@ -1824,7 +1825,7 @@
           <a:p>
             <a:fld id="{6BFECD78-3C8E-49F2-8FAB-59489D168ABB}" type="datetimeFigureOut">
               <a:rPr lang="en-US" smtClean="0"/>
-              <a:t>11/9/16</a:t>
+              <a:t>11/15/16</a:t>
             </a:fld>
             <a:endParaRPr lang="en-US"/>
           </a:p>
@@ -1942,7 +1943,7 @@
           <a:p>
             <a:fld id="{6BFECD78-3C8E-49F2-8FAB-59489D168ABB}" type="datetimeFigureOut">
               <a:rPr lang="en-US" smtClean="0"/>
-              <a:t>11/9/16</a:t>
+              <a:t>11/15/16</a:t>
             </a:fld>
             <a:endParaRPr lang="en-US"/>
           </a:p>
@@ -2037,7 +2038,7 @@
           <a:p>
             <a:fld id="{6BFECD78-3C8E-49F2-8FAB-59489D168ABB}" type="datetimeFigureOut">
               <a:rPr lang="en-US" smtClean="0"/>
-              <a:t>11/9/16</a:t>
+              <a:t>11/15/16</a:t>
             </a:fld>
             <a:endParaRPr lang="en-US"/>
           </a:p>
@@ -2314,7 +2315,7 @@
           <a:p>
             <a:fld id="{6BFECD78-3C8E-49F2-8FAB-59489D168ABB}" type="datetimeFigureOut">
               <a:rPr lang="en-US" smtClean="0"/>
-              <a:t>11/9/16</a:t>
+              <a:t>11/15/16</a:t>
             </a:fld>
             <a:endParaRPr lang="en-US"/>
           </a:p>
@@ -2571,7 +2572,7 @@
           <a:p>
             <a:fld id="{6BFECD78-3C8E-49F2-8FAB-59489D168ABB}" type="datetimeFigureOut">
               <a:rPr lang="en-US" smtClean="0"/>
-              <a:t>11/9/16</a:t>
+              <a:t>11/15/16</a:t>
             </a:fld>
             <a:endParaRPr lang="en-US"/>
           </a:p>
@@ -2784,7 +2785,7 @@
           <a:p>
             <a:fld id="{6BFECD78-3C8E-49F2-8FAB-59489D168ABB}" type="datetimeFigureOut">
               <a:rPr lang="en-US" smtClean="0"/>
-              <a:t>11/9/16</a:t>
+              <a:t>11/15/16</a:t>
             </a:fld>
             <a:endParaRPr lang="en-US"/>
           </a:p>
@@ -3638,7 +3639,7 @@
             <a:pPr algn="l"/>
             <a:r>
               <a:rPr lang="en-US" dirty="0" smtClean="0"/>
-              <a:t>Shell</a:t>
+              <a:t>Thread</a:t>
             </a:r>
           </a:p>
           <a:p>
@@ -3648,12 +3649,9 @@
             </a:pPr>
             <a:r>
               <a:rPr lang="en-US" dirty="0" smtClean="0"/>
-              <a:t>Command </a:t>
-            </a:r>
-            <a:r>
-              <a:rPr lang="en-US" dirty="0"/>
-              <a:t>interpreter program</a:t>
-            </a:r>
+              <a:t>Unit of execution for the process</a:t>
+            </a:r>
+            <a:endParaRPr lang="en-US" dirty="0"/>
           </a:p>
           <a:p>
             <a:pPr marL="342900" indent="-342900" algn="l">
@@ -3662,7 +3660,7 @@
             </a:pPr>
             <a:r>
               <a:rPr lang="en-US" dirty="0" smtClean="0"/>
-              <a:t>What you get at the CLI</a:t>
+              <a:t>A thread has a stack</a:t>
             </a:r>
           </a:p>
           <a:p>
@@ -3672,72 +3670,34 @@
             </a:pPr>
             <a:r>
               <a:rPr lang="en-US" dirty="0" smtClean="0"/>
-              <a:t>Convenient abstraction containing</a:t>
-            </a:r>
-          </a:p>
-          <a:p>
-            <a:pPr marL="800100" lvl="1" indent="-342900" algn="l">
-              <a:buFont typeface="Arial"/>
-              <a:buChar char="•"/>
-            </a:pPr>
-            <a:r>
-              <a:rPr lang="en-US" dirty="0" smtClean="0"/>
-              <a:t>Running processes (</a:t>
-            </a:r>
-            <a:r>
-              <a:rPr lang="en-US" dirty="0"/>
-              <a:t>'</a:t>
-            </a:r>
-            <a:r>
-              <a:rPr lang="en-US" dirty="0" err="1"/>
-              <a:t>ps</a:t>
-            </a:r>
-            <a:r>
-              <a:rPr lang="en-US" dirty="0"/>
-              <a:t> aux</a:t>
-            </a:r>
-            <a:r>
-              <a:rPr lang="en-US" dirty="0" smtClean="0"/>
-              <a:t>')</a:t>
+              <a:t>Basically </a:t>
+            </a:r>
+            <a:r>
+              <a:rPr lang="en-US" i="1" dirty="0" smtClean="0"/>
+              <a:t>is </a:t>
+            </a:r>
+            <a:r>
+              <a:rPr lang="en-US" dirty="0" smtClean="0"/>
+              <a:t>the stack</a:t>
+            </a:r>
+          </a:p>
+          <a:p>
+            <a:pPr marL="342900" indent="-342900" algn="l">
+              <a:buFont typeface="Arial"/>
+              <a:buChar char="•"/>
+            </a:pPr>
+            <a:r>
+              <a:rPr lang="en-US" dirty="0" smtClean="0"/>
+              <a:t>If &gt; 1 in process, shares resources</a:t>
             </a:r>
             <a:endParaRPr lang="en-US" dirty="0"/>
-          </a:p>
-          <a:p>
-            <a:pPr marL="800100" lvl="1" indent="-342900" algn="l">
-              <a:buFont typeface="Arial"/>
-              <a:buChar char="•"/>
-            </a:pPr>
-            <a:r>
-              <a:rPr lang="en-US" dirty="0" smtClean="0"/>
-              <a:t>Environment variables</a:t>
-            </a:r>
-          </a:p>
-          <a:p>
-            <a:pPr marL="800100" lvl="1" indent="-342900" algn="l">
-              <a:buFont typeface="Arial"/>
-              <a:buChar char="•"/>
-            </a:pPr>
-            <a:r>
-              <a:rPr lang="en-US" dirty="0" smtClean="0"/>
-              <a:t>User/group permissions</a:t>
-            </a:r>
-          </a:p>
-          <a:p>
-            <a:pPr marL="342900" indent="-342900" algn="l">
-              <a:buFont typeface="Arial"/>
-              <a:buChar char="•"/>
-            </a:pPr>
-            <a:r>
-              <a:rPr lang="en-US" dirty="0" smtClean="0"/>
-              <a:t>Expensive to start</a:t>
-            </a:r>
           </a:p>
         </p:txBody>
       </p:sp>
     </p:spTree>
     <p:extLst>
       <p:ext uri="{BB962C8B-B14F-4D97-AF65-F5344CB8AC3E}">
-        <p14:creationId xmlns:p14="http://schemas.microsoft.com/office/powerpoint/2010/main" val="2860743356"/>
+        <p14:creationId xmlns:p14="http://schemas.microsoft.com/office/powerpoint/2010/main" val="2769125060"/>
       </p:ext>
     </p:extLst>
   </p:cSld>
@@ -3818,7 +3778,7 @@
             <a:pPr algn="l"/>
             <a:r>
               <a:rPr lang="en-US" dirty="0" smtClean="0"/>
-              <a:t>Thread</a:t>
+              <a:t>Shell</a:t>
             </a:r>
           </a:p>
           <a:p>
@@ -3828,55 +3788,96 @@
             </a:pPr>
             <a:r>
               <a:rPr lang="en-US" dirty="0" smtClean="0"/>
-              <a:t>Unit of execution for the process</a:t>
+              <a:t>Command </a:t>
+            </a:r>
+            <a:r>
+              <a:rPr lang="en-US" dirty="0"/>
+              <a:t>interpreter program</a:t>
+            </a:r>
+          </a:p>
+          <a:p>
+            <a:pPr marL="342900" indent="-342900" algn="l">
+              <a:buFont typeface="Arial"/>
+              <a:buChar char="•"/>
+            </a:pPr>
+            <a:r>
+              <a:rPr lang="en-US" dirty="0" smtClean="0"/>
+              <a:t>What you get at the CLI</a:t>
+            </a:r>
+          </a:p>
+          <a:p>
+            <a:pPr marL="342900" indent="-342900" algn="l">
+              <a:buFont typeface="Arial"/>
+              <a:buChar char="•"/>
+            </a:pPr>
+            <a:r>
+              <a:rPr lang="en-US" dirty="0" smtClean="0"/>
+              <a:t>Convenient abstraction containing</a:t>
+            </a:r>
+          </a:p>
+          <a:p>
+            <a:pPr marL="800100" lvl="1" indent="-342900" algn="l">
+              <a:buFont typeface="Arial"/>
+              <a:buChar char="•"/>
+            </a:pPr>
+            <a:r>
+              <a:rPr lang="en-US" dirty="0" smtClean="0"/>
+              <a:t>Running processes (</a:t>
+            </a:r>
+            <a:r>
+              <a:rPr lang="en-US" dirty="0"/>
+              <a:t>'</a:t>
+            </a:r>
+            <a:r>
+              <a:rPr lang="en-US" dirty="0" err="1"/>
+              <a:t>ps</a:t>
+            </a:r>
+            <a:r>
+              <a:rPr lang="en-US" dirty="0"/>
+              <a:t> aux</a:t>
+            </a:r>
+            <a:r>
+              <a:rPr lang="en-US" dirty="0" smtClean="0"/>
+              <a:t>')</a:t>
             </a:r>
             <a:endParaRPr lang="en-US" dirty="0"/>
           </a:p>
           <a:p>
+            <a:pPr marL="800100" lvl="1" indent="-342900" algn="l">
+              <a:buFont typeface="Arial"/>
+              <a:buChar char="•"/>
+            </a:pPr>
+            <a:r>
+              <a:rPr lang="en-US" dirty="0" smtClean="0"/>
+              <a:t>Environment variables</a:t>
+            </a:r>
+          </a:p>
+          <a:p>
+            <a:pPr marL="800100" lvl="1" indent="-342900" algn="l">
+              <a:buFont typeface="Arial"/>
+              <a:buChar char="•"/>
+            </a:pPr>
+            <a:r>
+              <a:rPr lang="en-US" dirty="0" smtClean="0"/>
+              <a:t>User/group permissions</a:t>
+            </a:r>
+          </a:p>
+          <a:p>
             <a:pPr marL="342900" indent="-342900" algn="l">
               <a:buFont typeface="Arial"/>
               <a:buChar char="•"/>
             </a:pPr>
             <a:r>
               <a:rPr lang="en-US" dirty="0" smtClean="0"/>
-              <a:t>A thread has a stack</a:t>
-            </a:r>
-          </a:p>
-          <a:p>
-            <a:pPr marL="342900" indent="-342900" algn="l">
-              <a:buFont typeface="Arial"/>
-              <a:buChar char="•"/>
-            </a:pPr>
-            <a:r>
-              <a:rPr lang="en-US" dirty="0" smtClean="0"/>
-              <a:t>Basically </a:t>
-            </a:r>
-            <a:r>
-              <a:rPr lang="en-US" i="1" dirty="0" smtClean="0"/>
-              <a:t>is </a:t>
-            </a:r>
-            <a:r>
-              <a:rPr lang="en-US" dirty="0" smtClean="0"/>
-              <a:t>the stack</a:t>
-            </a:r>
-          </a:p>
-          <a:p>
-            <a:pPr marL="342900" indent="-342900" algn="l">
-              <a:buFont typeface="Arial"/>
-              <a:buChar char="•"/>
-            </a:pPr>
-            <a:r>
-              <a:rPr lang="en-US" dirty="0" smtClean="0"/>
-              <a:t>If &gt; 1 in process, shares resources</a:t>
-            </a:r>
-            <a:endParaRPr lang="en-US" dirty="0"/>
+              <a:t>Expensive to start</a:t>
+            </a:r>
           </a:p>
         </p:txBody>
       </p:sp>
     </p:spTree>
     <p:extLst>
       <p:ext uri="{BB962C8B-B14F-4D97-AF65-F5344CB8AC3E}">
-        <p14:creationId xmlns:p14="http://schemas.microsoft.com/office/powerpoint/2010/main" val="2769125060"/>
+        <p14:creationId xmlns:p14="http://schemas.microsoft.com/office/powerpoint/2010/main" val="2860743356"/>
       </p:ext>
     </p:extLst>
   </p:cSld>
@@ -8338,8 +8339,13 @@
             </a:pPr>
             <a:r>
               <a:rPr lang="en-US" dirty="0"/>
-              <a:t>Advanced JavaScript</a:t>
-            </a:r>
+              <a:t>Advanced </a:t>
+            </a:r>
+            <a:r>
+              <a:rPr lang="en-US" dirty="0" smtClean="0"/>
+              <a:t>JavaScript review</a:t>
+            </a:r>
+            <a:endParaRPr lang="en-US" dirty="0"/>
           </a:p>
           <a:p>
             <a:pPr marL="457200" indent="-457200" algn="l">
@@ -12415,15 +12421,11 @@
             </a:pPr>
             <a:r>
               <a:rPr lang="en-US" dirty="0" smtClean="0"/>
-              <a:t>Naïve </a:t>
-            </a:r>
-            <a:r>
-              <a:rPr lang="en-US" dirty="0"/>
-              <a:t>–</a:t>
-            </a:r>
-            <a:r>
-              <a:rPr lang="en-US" dirty="0" smtClean="0"/>
-              <a:t> hope and pray, add resources</a:t>
+              <a:t>Fork </a:t>
+            </a:r>
+            <a:r>
+              <a:rPr lang="en-US" dirty="0" smtClean="0"/>
+              <a:t>– start a new process</a:t>
             </a:r>
           </a:p>
           <a:p>
@@ -12433,7 +12435,17 @@
             </a:pPr>
             <a:r>
               <a:rPr lang="en-US" dirty="0" smtClean="0"/>
-              <a:t>Fork – start a new process</a:t>
+              <a:t>Threads – parallelize within a process</a:t>
+            </a:r>
+          </a:p>
+          <a:p>
+            <a:pPr lvl="1" indent="-457200" algn="l">
+              <a:buFont typeface="Arial"/>
+              <a:buChar char="•"/>
+            </a:pPr>
+            <a:r>
+              <a:rPr lang="en-US" dirty="0" smtClean="0"/>
+              <a:t>Pros and Cons</a:t>
             </a:r>
           </a:p>
           <a:p>
@@ -12443,37 +12455,11 @@
             </a:pPr>
             <a:r>
               <a:rPr lang="en-US" dirty="0" smtClean="0"/>
-              <a:t>Threads – parallelize within a process</a:t>
-            </a:r>
-          </a:p>
-          <a:p>
-            <a:pPr lvl="1" indent="-457200" algn="l">
-              <a:buFont typeface="Arial"/>
-              <a:buChar char="•"/>
-            </a:pPr>
-            <a:r>
-              <a:rPr lang="en-US" dirty="0" smtClean="0"/>
-              <a:t>Pros and Cons</a:t>
-            </a:r>
-          </a:p>
-          <a:p>
-            <a:pPr lvl="2" indent="-457200" algn="l">
-              <a:buFont typeface="Arial"/>
-              <a:buChar char="•"/>
-            </a:pPr>
-            <a:r>
-              <a:rPr lang="en-US" dirty="0" smtClean="0"/>
-              <a:t>Naïve – easy, but weak</a:t>
-            </a:r>
-          </a:p>
-          <a:p>
-            <a:pPr lvl="2" indent="-457200" algn="l">
-              <a:buFont typeface="Arial"/>
-              <a:buChar char="•"/>
-            </a:pPr>
-            <a:r>
-              <a:rPr lang="en-US" dirty="0" smtClean="0"/>
-              <a:t>Fork – simple, full featured, resource hog</a:t>
+              <a:t>Fork </a:t>
+            </a:r>
+            <a:r>
+              <a:rPr lang="en-US" dirty="0" smtClean="0"/>
+              <a:t>– simple, full featured, resource hog</a:t>
             </a:r>
           </a:p>
           <a:p>
@@ -13717,6 +13703,142 @@
 </p:sld>
 </file>
 
+<file path=ppt/slides/slide62.xml><?xml version="1.0" encoding="utf-8"?>
+<p:sld xmlns:a="http://schemas.openxmlformats.org/drawingml/2006/main" xmlns:r="http://schemas.openxmlformats.org/officeDocument/2006/relationships" xmlns:p="http://schemas.openxmlformats.org/presentationml/2006/main">
+  <p:cSld>
+    <p:spTree>
+      <p:nvGrpSpPr>
+        <p:cNvPr id="1" name=""/>
+        <p:cNvGrpSpPr/>
+        <p:nvPr/>
+      </p:nvGrpSpPr>
+      <p:grpSpPr>
+        <a:xfrm>
+          <a:off x="0" y="0"/>
+          <a:ext cx="0" cy="0"/>
+          <a:chOff x="0" y="0"/>
+          <a:chExt cx="0" cy="0"/>
+        </a:xfrm>
+      </p:grpSpPr>
+      <p:sp>
+        <p:nvSpPr>
+          <p:cNvPr id="2" name="Title 1"/>
+          <p:cNvSpPr>
+            <a:spLocks noGrp="1"/>
+          </p:cNvSpPr>
+          <p:nvPr>
+            <p:ph type="ctrTitle"/>
+          </p:nvPr>
+        </p:nvSpPr>
+        <p:spPr>
+          <a:xfrm>
+            <a:off x="685800" y="160685"/>
+            <a:ext cx="7772400" cy="1470025"/>
+          </a:xfrm>
+        </p:spPr>
+        <p:txBody>
+          <a:bodyPr/>
+          <a:lstStyle/>
+          <a:p>
+            <a:r>
+              <a:rPr lang="en-US" dirty="0" smtClean="0"/>
+              <a:t>Lab: </a:t>
+            </a:r>
+            <a:r>
+              <a:rPr lang="en-US" dirty="0" smtClean="0"/>
+              <a:t>examine event loop</a:t>
+            </a:r>
+            <a:endParaRPr lang="en-US" dirty="0"/>
+          </a:p>
+        </p:txBody>
+      </p:sp>
+      <p:sp>
+        <p:nvSpPr>
+          <p:cNvPr id="3" name="Subtitle 2"/>
+          <p:cNvSpPr>
+            <a:spLocks noGrp="1"/>
+          </p:cNvSpPr>
+          <p:nvPr>
+            <p:ph type="subTitle" idx="1"/>
+          </p:nvPr>
+        </p:nvSpPr>
+        <p:spPr>
+          <a:xfrm>
+            <a:off x="1371600" y="1630710"/>
+            <a:ext cx="6400800" cy="4609893"/>
+          </a:xfrm>
+        </p:spPr>
+        <p:txBody>
+          <a:bodyPr>
+            <a:normAutofit/>
+          </a:bodyPr>
+          <a:lstStyle/>
+          <a:p>
+            <a:pPr lvl="1" indent="-457200" algn="l">
+              <a:buFont typeface="Arial"/>
+              <a:buChar char="•"/>
+            </a:pPr>
+            <a:r>
+              <a:rPr lang="en-US" dirty="0" smtClean="0"/>
+              <a:t>Examine examples</a:t>
+            </a:r>
+          </a:p>
+          <a:p>
+            <a:pPr lvl="1" indent="-457200" algn="l">
+              <a:buFont typeface="Arial"/>
+              <a:buChar char="•"/>
+            </a:pPr>
+            <a:r>
+              <a:rPr lang="en-US" dirty="0" smtClean="0"/>
+              <a:t>examples</a:t>
+            </a:r>
+            <a:r>
+              <a:rPr lang="en-US" dirty="0"/>
+              <a:t>/event-loop-and-</a:t>
+            </a:r>
+            <a:r>
+              <a:rPr lang="en-US" dirty="0" err="1"/>
+              <a:t>settimeout.js</a:t>
+            </a:r>
+            <a:r>
+              <a:rPr lang="en-US" dirty="0"/>
+              <a:t> </a:t>
+            </a:r>
+          </a:p>
+          <a:p>
+            <a:pPr lvl="1" indent="-457200" algn="l">
+              <a:buFont typeface="Arial"/>
+              <a:buChar char="•"/>
+            </a:pPr>
+            <a:r>
+              <a:rPr lang="en-US" dirty="0" smtClean="0"/>
+              <a:t>examples</a:t>
+            </a:r>
+            <a:r>
+              <a:rPr lang="en-US" dirty="0"/>
+              <a:t>/call-stack-and-</a:t>
+            </a:r>
+            <a:r>
+              <a:rPr lang="en-US" dirty="0" err="1"/>
+              <a:t>settimeout.js</a:t>
+            </a:r>
+            <a:endParaRPr lang="en-US" dirty="0" smtClean="0"/>
+          </a:p>
+        </p:txBody>
+      </p:sp>
+    </p:spTree>
+    <p:extLst>
+      <p:ext uri="{BB962C8B-B14F-4D97-AF65-F5344CB8AC3E}">
+        <p14:creationId xmlns:p14="http://schemas.microsoft.com/office/powerpoint/2010/main" val="4258291394"/>
+      </p:ext>
+    </p:extLst>
+  </p:cSld>
+  <p:clrMapOvr>
+    <a:masterClrMapping/>
+  </p:clrMapOvr>
+</p:sld>
+</file>
+
 <file path=ppt/slides/slide7.xml><?xml version="1.0" encoding="utf-8"?>
 <p:sld xmlns:a="http://schemas.openxmlformats.org/drawingml/2006/main" xmlns:r="http://schemas.openxmlformats.org/officeDocument/2006/relationships" xmlns:p="http://schemas.openxmlformats.org/presentationml/2006/main">
   <p:cSld>
@@ -13810,6 +13932,17 @@
               <a:rPr lang="en-US" dirty="0" smtClean="0"/>
               <a:t>Process</a:t>
             </a:r>
+            <a:endParaRPr lang="en-US" dirty="0" smtClean="0"/>
+          </a:p>
+          <a:p>
+            <a:pPr marL="342900" indent="-342900" algn="l">
+              <a:buFont typeface="Arial"/>
+              <a:buChar char="•"/>
+            </a:pPr>
+            <a:r>
+              <a:rPr lang="en-US" dirty="0" smtClean="0"/>
+              <a:t>Thread</a:t>
+            </a:r>
           </a:p>
           <a:p>
             <a:pPr marL="342900" indent="-342900" algn="l">
@@ -13821,16 +13954,6 @@
               <a:t>Shell</a:t>
             </a:r>
             <a:endParaRPr lang="en-US" dirty="0" smtClean="0"/>
-          </a:p>
-          <a:p>
-            <a:pPr marL="342900" indent="-342900" algn="l">
-              <a:buFont typeface="Arial"/>
-              <a:buChar char="•"/>
-            </a:pPr>
-            <a:r>
-              <a:rPr lang="en-US" dirty="0" smtClean="0"/>
-              <a:t>Thread</a:t>
-            </a:r>
           </a:p>
           <a:p>
             <a:pPr marL="342900" indent="-342900" algn="l">

</xml_diff>